<commit_message>
edit CSS and add img of Event
</commit_message>
<xml_diff>
--- a/イベントシステム文書/5.Event System(発表用).pptx
+++ b/イベントシステム文書/5.Event System(発表用).pptx
@@ -5,7 +5,7 @@
     <p:sldMasterId id="2147483648" r:id="rId1"/>
   </p:sldMasterIdLst>
   <p:notesMasterIdLst>
-    <p:notesMasterId r:id="rId15"/>
+    <p:notesMasterId r:id="rId16"/>
   </p:notesMasterIdLst>
   <p:sldIdLst>
     <p:sldId id="256" r:id="rId2"/>
@@ -18,9 +18,10 @@
     <p:sldId id="262" r:id="rId9"/>
     <p:sldId id="265" r:id="rId10"/>
     <p:sldId id="263" r:id="rId11"/>
-    <p:sldId id="266" r:id="rId12"/>
-    <p:sldId id="267" r:id="rId13"/>
-    <p:sldId id="269" r:id="rId14"/>
+    <p:sldId id="271" r:id="rId12"/>
+    <p:sldId id="266" r:id="rId13"/>
+    <p:sldId id="267" r:id="rId14"/>
+    <p:sldId id="269" r:id="rId15"/>
   </p:sldIdLst>
   <p:sldSz cx="12192000" cy="6858000"/>
   <p:notesSz cx="6858000" cy="9144000"/>
@@ -119,6 +120,11 @@
       </a:defRPr>
     </a:lvl9pPr>
   </p:defaultTextStyle>
+  <p:extLst>
+    <p:ext uri="{EFAFB233-063F-42B5-8137-9DF3F51BA10A}">
+      <p15:sldGuideLst xmlns:p15="http://schemas.microsoft.com/office/powerpoint/2012/main"/>
+    </p:ext>
+  </p:extLst>
 </p:presentation>
 </file>
 
@@ -204,7 +210,7 @@
           <a:p>
             <a:fld id="{297CDE44-0BE5-43B3-822E-DE3FF3C315A3}" type="datetimeFigureOut">
               <a:rPr kumimoji="1" lang="ja-JP" altLang="en-US" smtClean="0"/>
-              <a:t>2019/6/24</a:t>
+              <a:t>2019/6/27</a:t>
             </a:fld>
             <a:endParaRPr kumimoji="1" lang="ja-JP" altLang="en-US"/>
           </a:p>
@@ -723,7 +729,7 @@
           <a:p>
             <a:fld id="{093AC793-4D74-4BF1-8754-552E5CFD7C6D}" type="datetimeFigureOut">
               <a:rPr kumimoji="1" lang="ja-JP" altLang="en-US" smtClean="0"/>
-              <a:t>2019/6/24</a:t>
+              <a:t>2019/6/27</a:t>
             </a:fld>
             <a:endParaRPr kumimoji="1" lang="ja-JP" altLang="en-US"/>
           </a:p>
@@ -925,7 +931,7 @@
           <a:p>
             <a:fld id="{093AC793-4D74-4BF1-8754-552E5CFD7C6D}" type="datetimeFigureOut">
               <a:rPr kumimoji="1" lang="ja-JP" altLang="en-US" smtClean="0"/>
-              <a:t>2019/6/24</a:t>
+              <a:t>2019/6/27</a:t>
             </a:fld>
             <a:endParaRPr kumimoji="1" lang="ja-JP" altLang="en-US"/>
           </a:p>
@@ -1137,7 +1143,7 @@
           <a:p>
             <a:fld id="{093AC793-4D74-4BF1-8754-552E5CFD7C6D}" type="datetimeFigureOut">
               <a:rPr kumimoji="1" lang="ja-JP" altLang="en-US" smtClean="0"/>
-              <a:t>2019/6/24</a:t>
+              <a:t>2019/6/27</a:t>
             </a:fld>
             <a:endParaRPr kumimoji="1" lang="ja-JP" altLang="en-US"/>
           </a:p>
@@ -1339,7 +1345,7 @@
           <a:p>
             <a:fld id="{093AC793-4D74-4BF1-8754-552E5CFD7C6D}" type="datetimeFigureOut">
               <a:rPr kumimoji="1" lang="ja-JP" altLang="en-US" smtClean="0"/>
-              <a:t>2019/6/24</a:t>
+              <a:t>2019/6/27</a:t>
             </a:fld>
             <a:endParaRPr kumimoji="1" lang="ja-JP" altLang="en-US"/>
           </a:p>
@@ -1585,7 +1591,7 @@
           <a:p>
             <a:fld id="{093AC793-4D74-4BF1-8754-552E5CFD7C6D}" type="datetimeFigureOut">
               <a:rPr kumimoji="1" lang="ja-JP" altLang="en-US" smtClean="0"/>
-              <a:t>2019/6/24</a:t>
+              <a:t>2019/6/27</a:t>
             </a:fld>
             <a:endParaRPr kumimoji="1" lang="ja-JP" altLang="en-US"/>
           </a:p>
@@ -1881,7 +1887,7 @@
           <a:p>
             <a:fld id="{093AC793-4D74-4BF1-8754-552E5CFD7C6D}" type="datetimeFigureOut">
               <a:rPr kumimoji="1" lang="ja-JP" altLang="en-US" smtClean="0"/>
-              <a:t>2019/6/24</a:t>
+              <a:t>2019/6/27</a:t>
             </a:fld>
             <a:endParaRPr kumimoji="1" lang="ja-JP" altLang="en-US"/>
           </a:p>
@@ -2312,7 +2318,7 @@
           <a:p>
             <a:fld id="{093AC793-4D74-4BF1-8754-552E5CFD7C6D}" type="datetimeFigureOut">
               <a:rPr kumimoji="1" lang="ja-JP" altLang="en-US" smtClean="0"/>
-              <a:t>2019/6/24</a:t>
+              <a:t>2019/6/27</a:t>
             </a:fld>
             <a:endParaRPr kumimoji="1" lang="ja-JP" altLang="en-US"/>
           </a:p>
@@ -2430,7 +2436,7 @@
           <a:p>
             <a:fld id="{093AC793-4D74-4BF1-8754-552E5CFD7C6D}" type="datetimeFigureOut">
               <a:rPr kumimoji="1" lang="ja-JP" altLang="en-US" smtClean="0"/>
-              <a:t>2019/6/24</a:t>
+              <a:t>2019/6/27</a:t>
             </a:fld>
             <a:endParaRPr kumimoji="1" lang="ja-JP" altLang="en-US"/>
           </a:p>
@@ -2525,7 +2531,7 @@
           <a:p>
             <a:fld id="{093AC793-4D74-4BF1-8754-552E5CFD7C6D}" type="datetimeFigureOut">
               <a:rPr kumimoji="1" lang="ja-JP" altLang="en-US" smtClean="0"/>
-              <a:t>2019/6/24</a:t>
+              <a:t>2019/6/27</a:t>
             </a:fld>
             <a:endParaRPr kumimoji="1" lang="ja-JP" altLang="en-US"/>
           </a:p>
@@ -2834,7 +2840,7 @@
           <a:p>
             <a:fld id="{093AC793-4D74-4BF1-8754-552E5CFD7C6D}" type="datetimeFigureOut">
               <a:rPr kumimoji="1" lang="ja-JP" altLang="en-US" smtClean="0"/>
-              <a:t>2019/6/24</a:t>
+              <a:t>2019/6/27</a:t>
             </a:fld>
             <a:endParaRPr kumimoji="1" lang="ja-JP" altLang="en-US"/>
           </a:p>
@@ -3087,7 +3093,7 @@
           <a:p>
             <a:fld id="{093AC793-4D74-4BF1-8754-552E5CFD7C6D}" type="datetimeFigureOut">
               <a:rPr kumimoji="1" lang="ja-JP" altLang="en-US" smtClean="0"/>
-              <a:t>2019/6/24</a:t>
+              <a:t>2019/6/27</a:t>
             </a:fld>
             <a:endParaRPr kumimoji="1" lang="ja-JP" altLang="en-US"/>
           </a:p>
@@ -3332,7 +3338,7 @@
           <a:p>
             <a:fld id="{093AC793-4D74-4BF1-8754-552E5CFD7C6D}" type="datetimeFigureOut">
               <a:rPr kumimoji="1" lang="ja-JP" altLang="en-US" smtClean="0"/>
-              <a:t>2019/6/24</a:t>
+              <a:t>2019/6/27</a:t>
             </a:fld>
             <a:endParaRPr kumimoji="1" lang="ja-JP" altLang="en-US"/>
           </a:p>
@@ -5127,41 +5133,110 @@
       </p:grpSpPr>
       <p:sp>
         <p:nvSpPr>
-          <p:cNvPr id="2" name="タイトル 1"/>
-          <p:cNvSpPr>
-            <a:spLocks noGrp="1"/>
-          </p:cNvSpPr>
-          <p:nvPr>
-            <p:ph type="title"/>
-          </p:nvPr>
+          <p:cNvPr id="8" name="テキスト ボックス 7"/>
+          <p:cNvSpPr txBox="1"/>
+          <p:nvPr/>
         </p:nvSpPr>
         <p:spPr>
           <a:xfrm>
-            <a:off x="1885950" y="1458452"/>
-            <a:ext cx="9467850" cy="1325563"/>
+            <a:off x="1779635" y="870649"/>
+            <a:ext cx="8285566" cy="800219"/>
           </a:xfrm>
+          <a:prstGeom prst="rect">
+            <a:avLst/>
+          </a:prstGeom>
+          <a:noFill/>
         </p:spPr>
         <p:txBody>
-          <a:bodyPr>
-            <a:normAutofit/>
+          <a:bodyPr wrap="square" rtlCol="0">
+            <a:spAutoFit/>
           </a:bodyPr>
           <a:lstStyle/>
           <a:p>
-            <a:r>
-              <a:rPr kumimoji="1" lang="en-US" altLang="ja-JP" sz="3200" dirty="0" smtClean="0">
+            <a:pPr marL="342900" indent="-342900" algn="just">
+              <a:lnSpc>
+                <a:spcPct val="115000"/>
+              </a:lnSpc>
+              <a:buFont typeface="Arial" panose="020B0604020202020204" pitchFamily="34" charset="0"/>
+              <a:buChar char="•"/>
+            </a:pPr>
+            <a:r>
+              <a:rPr lang="ja-JP" altLang="en-US" sz="2000" b="1" kern="100" dirty="0" smtClean="0">
+                <a:effectLst/>
                 <a:latin typeface="HGP教科書体" panose="02020600000000000000" pitchFamily="18" charset="-128"/>
                 <a:ea typeface="HGP教科書体" panose="02020600000000000000" pitchFamily="18" charset="-128"/>
               </a:rPr>
-              <a:t>3.</a:t>
-            </a:r>
-            <a:r>
-              <a:rPr kumimoji="1" lang="ja-JP" altLang="en-US" sz="3200" dirty="0" smtClean="0">
+              <a:t>最近のイベント（カレンダーで）</a:t>
+            </a:r>
+            <a:r>
+              <a:rPr lang="ja-JP" altLang="ja-JP" sz="2000" b="1" kern="100" dirty="0" smtClean="0">
+                <a:effectLst/>
                 <a:latin typeface="HGP教科書体" panose="02020600000000000000" pitchFamily="18" charset="-128"/>
                 <a:ea typeface="HGP教科書体" panose="02020600000000000000" pitchFamily="18" charset="-128"/>
               </a:rPr>
-              <a:t>イベントシステムの展示</a:t>
-            </a:r>
-            <a:endParaRPr kumimoji="1" lang="ja-JP" altLang="en-US" sz="3200" dirty="0">
+              <a:t>一覧の閲覧</a:t>
+            </a:r>
+            <a:endParaRPr lang="en-US" altLang="ja-JP" sz="2000" b="1" kern="100" dirty="0" smtClean="0">
+              <a:effectLst/>
+              <a:latin typeface="HGP教科書体" panose="02020600000000000000" pitchFamily="18" charset="-128"/>
+              <a:ea typeface="HGP教科書体" panose="02020600000000000000" pitchFamily="18" charset="-128"/>
+            </a:endParaRPr>
+          </a:p>
+          <a:p>
+            <a:pPr algn="just">
+              <a:lnSpc>
+                <a:spcPct val="115000"/>
+              </a:lnSpc>
+            </a:pPr>
+            <a:r>
+              <a:rPr lang="ja-JP" altLang="en-US" sz="2000" kern="100" dirty="0">
+                <a:latin typeface="HGP教科書体" panose="02020600000000000000" pitchFamily="18" charset="-128"/>
+                <a:ea typeface="HGP教科書体" panose="02020600000000000000" pitchFamily="18" charset="-128"/>
+                <a:cs typeface="Times New Roman" panose="02020603050405020304" pitchFamily="18" charset="0"/>
+              </a:rPr>
+              <a:t>イベントの開催された場所に</a:t>
+            </a:r>
+            <a:r>
+              <a:rPr lang="ja-JP" altLang="en-US" sz="2000" kern="100" dirty="0" smtClean="0">
+                <a:latin typeface="HGP教科書体" panose="02020600000000000000" pitchFamily="18" charset="-128"/>
+                <a:ea typeface="HGP教科書体" panose="02020600000000000000" pitchFamily="18" charset="-128"/>
+                <a:cs typeface="Times New Roman" panose="02020603050405020304" pitchFamily="18" charset="0"/>
+              </a:rPr>
+              <a:t>よって</a:t>
+            </a:r>
+            <a:r>
+              <a:rPr lang="en-US" altLang="ja-JP" sz="2000" kern="100" dirty="0" smtClean="0">
+                <a:latin typeface="HGP教科書体" panose="02020600000000000000" pitchFamily="18" charset="-128"/>
+                <a:ea typeface="HGP教科書体" panose="02020600000000000000" pitchFamily="18" charset="-128"/>
+                <a:cs typeface="Times New Roman" panose="02020603050405020304" pitchFamily="18" charset="0"/>
+              </a:rPr>
+              <a:t>Google</a:t>
+            </a:r>
+            <a:r>
+              <a:rPr lang="ja-JP" altLang="en-US" sz="2000" kern="100" dirty="0">
+                <a:latin typeface="HGP教科書体" panose="02020600000000000000" pitchFamily="18" charset="-128"/>
+                <a:ea typeface="HGP教科書体" panose="02020600000000000000" pitchFamily="18" charset="-128"/>
+                <a:cs typeface="Times New Roman" panose="02020603050405020304" pitchFamily="18" charset="0"/>
+              </a:rPr>
+              <a:t> </a:t>
+            </a:r>
+            <a:r>
+              <a:rPr lang="en-US" altLang="ja-JP" sz="2000" kern="100" dirty="0" smtClean="0">
+                <a:latin typeface="HGP教科書体" panose="02020600000000000000" pitchFamily="18" charset="-128"/>
+                <a:ea typeface="HGP教科書体" panose="02020600000000000000" pitchFamily="18" charset="-128"/>
+                <a:cs typeface="Times New Roman" panose="02020603050405020304" pitchFamily="18" charset="0"/>
+              </a:rPr>
+              <a:t>Map</a:t>
+            </a:r>
+            <a:r>
+              <a:rPr lang="ja-JP" altLang="en-US" sz="2000" kern="100" dirty="0" smtClean="0">
+                <a:latin typeface="HGP教科書体" panose="02020600000000000000" pitchFamily="18" charset="-128"/>
+                <a:ea typeface="HGP教科書体" panose="02020600000000000000" pitchFamily="18" charset="-128"/>
+                <a:cs typeface="Times New Roman" panose="02020603050405020304" pitchFamily="18" charset="0"/>
+              </a:rPr>
+              <a:t>データを表示する。</a:t>
+            </a:r>
+            <a:endParaRPr lang="en-US" altLang="ja-JP" sz="2000" kern="100" dirty="0">
               <a:latin typeface="HGP教科書体" panose="02020600000000000000" pitchFamily="18" charset="-128"/>
               <a:ea typeface="HGP教科書体" panose="02020600000000000000" pitchFamily="18" charset="-128"/>
             </a:endParaRPr>
@@ -5727,7 +5802,7 @@
         <p:spPr>
           <a:xfrm>
             <a:off x="9892077" y="4608257"/>
-            <a:ext cx="1415773" cy="584775"/>
+            <a:ext cx="1415772" cy="584775"/>
           </a:xfrm>
           <a:prstGeom prst="rect">
             <a:avLst/>
@@ -5741,7 +5816,7 @@
           <a:lstStyle/>
           <a:p>
             <a:pPr algn="ctr"/>
-            <a:fld id="{94CDD9D3-4F8C-4199-931C-B43C77F34FE0}" type="slidenum">
+            <a:fld id="{ADAB549D-75BD-4B01-8931-37614D7A2B41}" type="slidenum">
               <a:rPr lang="ja-JP" altLang="en-US" sz="3200" b="0" cap="none" spc="0" smtClean="0">
                 <a:ln w="0"/>
                 <a:solidFill>
@@ -5801,46 +5876,174 @@
           </a:p>
         </p:txBody>
       </p:sp>
+      <p:pic>
+        <p:nvPicPr>
+          <p:cNvPr id="3" name="図 2"/>
+          <p:cNvPicPr>
+            <a:picLocks noChangeAspect="1"/>
+          </p:cNvPicPr>
+          <p:nvPr/>
+        </p:nvPicPr>
+        <p:blipFill rotWithShape="1">
+          <a:blip r:embed="rId2"/>
+          <a:srcRect l="27956" t="37867" r="37000" b="26999"/>
+          <a:stretch/>
+        </p:blipFill>
+        <p:spPr>
+          <a:xfrm>
+            <a:off x="1885950" y="2271754"/>
+            <a:ext cx="4272534" cy="2409463"/>
+          </a:xfrm>
+          <a:prstGeom prst="roundRect">
+            <a:avLst>
+              <a:gd name="adj" fmla="val 8594"/>
+            </a:avLst>
+          </a:prstGeom>
+          <a:solidFill>
+            <a:srgbClr val="FFFFFF">
+              <a:shade val="85000"/>
+            </a:srgbClr>
+          </a:solidFill>
+          <a:ln>
+            <a:noFill/>
+          </a:ln>
+          <a:effectLst>
+            <a:reflection blurRad="12700" stA="38000" endPos="28000" dist="5000" dir="5400000" sy="-100000" algn="bl" rotWithShape="0"/>
+          </a:effectLst>
+        </p:spPr>
+      </p:pic>
+      <p:pic>
+        <p:nvPicPr>
+          <p:cNvPr id="4" name="図 3"/>
+          <p:cNvPicPr>
+            <a:picLocks noChangeAspect="1"/>
+          </p:cNvPicPr>
+          <p:nvPr/>
+        </p:nvPicPr>
+        <p:blipFill rotWithShape="1">
+          <a:blip r:embed="rId3"/>
+          <a:srcRect l="34726" t="15200" r="29874" b="17600"/>
+          <a:stretch/>
+        </p:blipFill>
+        <p:spPr>
+          <a:xfrm>
+            <a:off x="6812280" y="1854627"/>
+            <a:ext cx="2576877" cy="2751580"/>
+          </a:xfrm>
+          <a:prstGeom prst="roundRect">
+            <a:avLst>
+              <a:gd name="adj" fmla="val 8594"/>
+            </a:avLst>
+          </a:prstGeom>
+          <a:solidFill>
+            <a:srgbClr val="FFFFFF">
+              <a:shade val="85000"/>
+            </a:srgbClr>
+          </a:solidFill>
+          <a:ln>
+            <a:noFill/>
+          </a:ln>
+          <a:effectLst>
+            <a:reflection blurRad="12700" stA="38000" endPos="28000" dist="5000" dir="5400000" sy="-100000" algn="bl" rotWithShape="0"/>
+          </a:effectLst>
+        </p:spPr>
+      </p:pic>
       <p:sp>
         <p:nvSpPr>
-          <p:cNvPr id="26" name="コンテンツ プレースホルダー 2"/>
-          <p:cNvSpPr>
-            <a:spLocks noGrp="1"/>
-          </p:cNvSpPr>
-          <p:nvPr>
-            <p:ph sz="half" idx="1"/>
-          </p:nvPr>
+          <p:cNvPr id="6" name="角丸四角形 5"/>
+          <p:cNvSpPr/>
+          <p:nvPr/>
         </p:nvSpPr>
         <p:spPr>
           <a:xfrm>
-            <a:off x="1885950" y="2853528"/>
-            <a:ext cx="4133850" cy="546100"/>
+            <a:off x="4413380" y="3196680"/>
+            <a:ext cx="569167" cy="339621"/>
           </a:xfrm>
+          <a:prstGeom prst="roundRect">
+            <a:avLst/>
+          </a:prstGeom>
+          <a:noFill/>
+          <a:ln w="28575">
+            <a:solidFill>
+              <a:srgbClr val="C00000"/>
+            </a:solidFill>
+          </a:ln>
         </p:spPr>
+        <p:style>
+          <a:lnRef idx="2">
+            <a:schemeClr val="accent1">
+              <a:shade val="50000"/>
+            </a:schemeClr>
+          </a:lnRef>
+          <a:fillRef idx="1">
+            <a:schemeClr val="accent1"/>
+          </a:fillRef>
+          <a:effectRef idx="0">
+            <a:schemeClr val="accent1"/>
+          </a:effectRef>
+          <a:fontRef idx="minor">
+            <a:schemeClr val="lt1"/>
+          </a:fontRef>
+        </p:style>
         <p:txBody>
-          <a:bodyPr>
-            <a:normAutofit/>
-          </a:bodyPr>
+          <a:bodyPr rtlCol="0" anchor="ctr"/>
           <a:lstStyle/>
           <a:p>
-            <a:r>
-              <a:rPr kumimoji="1" lang="ja-JP" altLang="en-US" sz="2400" dirty="0" smtClean="0">
-                <a:latin typeface="HGP教科書体" panose="02020600000000000000" pitchFamily="18" charset="-128"/>
-                <a:ea typeface="HGP教科書体" panose="02020600000000000000" pitchFamily="18" charset="-128"/>
-              </a:rPr>
-              <a:t>各機能を展示する</a:t>
-            </a:r>
-            <a:endParaRPr kumimoji="1" lang="ja-JP" altLang="en-US" sz="2400" dirty="0">
-              <a:latin typeface="HGP教科書体" panose="02020600000000000000" pitchFamily="18" charset="-128"/>
-              <a:ea typeface="HGP教科書体" panose="02020600000000000000" pitchFamily="18" charset="-128"/>
-            </a:endParaRPr>
+            <a:pPr algn="ctr"/>
+            <a:endParaRPr kumimoji="1" lang="ja-JP" altLang="en-US"/>
+          </a:p>
+        </p:txBody>
+      </p:sp>
+      <p:sp>
+        <p:nvSpPr>
+          <p:cNvPr id="7" name="右中かっこ 6"/>
+          <p:cNvSpPr/>
+          <p:nvPr/>
+        </p:nvSpPr>
+        <p:spPr>
+          <a:xfrm rot="10800000">
+            <a:off x="6309360" y="1854627"/>
+            <a:ext cx="334036" cy="2751579"/>
+          </a:xfrm>
+          <a:prstGeom prst="rightBrace">
+            <a:avLst>
+              <a:gd name="adj1" fmla="val 8333"/>
+              <a:gd name="adj2" fmla="val 48908"/>
+            </a:avLst>
+          </a:prstGeom>
+          <a:ln w="28575">
+            <a:solidFill>
+              <a:srgbClr val="C00000"/>
+            </a:solidFill>
+          </a:ln>
+        </p:spPr>
+        <p:style>
+          <a:lnRef idx="1">
+            <a:schemeClr val="accent1"/>
+          </a:lnRef>
+          <a:fillRef idx="0">
+            <a:schemeClr val="accent1"/>
+          </a:fillRef>
+          <a:effectRef idx="0">
+            <a:schemeClr val="accent1"/>
+          </a:effectRef>
+          <a:fontRef idx="minor">
+            <a:schemeClr val="tx1"/>
+          </a:fontRef>
+        </p:style>
+        <p:txBody>
+          <a:bodyPr rtlCol="0" anchor="ctr"/>
+          <a:lstStyle/>
+          <a:p>
+            <a:pPr algn="ctr"/>
+            <a:endParaRPr kumimoji="1" lang="ja-JP" altLang="en-US"/>
           </a:p>
         </p:txBody>
       </p:sp>
     </p:spTree>
     <p:extLst>
       <p:ext uri="{BB962C8B-B14F-4D97-AF65-F5344CB8AC3E}">
-        <p14:creationId xmlns:p14="http://schemas.microsoft.com/office/powerpoint/2010/main" val="1718279659"/>
+        <p14:creationId xmlns:p14="http://schemas.microsoft.com/office/powerpoint/2010/main" val="3239179270"/>
       </p:ext>
     </p:extLst>
   </p:cSld>
@@ -5886,7 +6089,7 @@
         </p:nvSpPr>
         <p:spPr>
           <a:xfrm>
-            <a:off x="1885950" y="608209"/>
+            <a:off x="1885950" y="1458452"/>
             <a:ext cx="9467850" cy="1325563"/>
           </a:xfrm>
         </p:spPr>
@@ -5901,14 +6104,14 @@
                 <a:latin typeface="HGP教科書体" panose="02020600000000000000" pitchFamily="18" charset="-128"/>
                 <a:ea typeface="HGP教科書体" panose="02020600000000000000" pitchFamily="18" charset="-128"/>
               </a:rPr>
-              <a:t>4.</a:t>
+              <a:t>3.</a:t>
             </a:r>
             <a:r>
               <a:rPr kumimoji="1" lang="ja-JP" altLang="en-US" sz="3200" dirty="0" smtClean="0">
                 <a:latin typeface="HGP教科書体" panose="02020600000000000000" pitchFamily="18" charset="-128"/>
                 <a:ea typeface="HGP教科書体" panose="02020600000000000000" pitchFamily="18" charset="-128"/>
               </a:rPr>
-              <a:t>今後研究の課題</a:t>
+              <a:t>イベントシステムの展示</a:t>
             </a:r>
             <a:endParaRPr kumimoji="1" lang="ja-JP" altLang="en-US" sz="3200" dirty="0">
               <a:latin typeface="HGP教科書体" panose="02020600000000000000" pitchFamily="18" charset="-128"/>
@@ -6475,6 +6678,755 @@
         </p:nvSpPr>
         <p:spPr>
           <a:xfrm>
+            <a:off x="9892077" y="4608257"/>
+            <a:ext cx="1415773" cy="584775"/>
+          </a:xfrm>
+          <a:prstGeom prst="rect">
+            <a:avLst/>
+          </a:prstGeom>
+          <a:noFill/>
+        </p:spPr>
+        <p:txBody>
+          <a:bodyPr wrap="none" lIns="91440" tIns="45720" rIns="91440" bIns="45720">
+            <a:spAutoFit/>
+          </a:bodyPr>
+          <a:lstStyle/>
+          <a:p>
+            <a:pPr algn="ctr"/>
+            <a:fld id="{94CDD9D3-4F8C-4199-931C-B43C77F34FE0}" type="slidenum">
+              <a:rPr lang="ja-JP" altLang="en-US" sz="3200" b="0" cap="none" spc="0" smtClean="0">
+                <a:ln w="0"/>
+                <a:solidFill>
+                  <a:srgbClr val="957BBE"/>
+                </a:solidFill>
+                <a:effectLst>
+                  <a:reflection blurRad="6350" stA="53000" endA="300" endPos="35500" dir="5400000" sy="-90000" algn="bl" rotWithShape="0"/>
+                </a:effectLst>
+              </a:rPr>
+              <a:t>12</a:t>
+            </a:fld>
+            <a:r>
+              <a:rPr lang="ja-JP" altLang="en-US" sz="3200" b="0" cap="none" spc="0" dirty="0" smtClean="0">
+                <a:ln w="0"/>
+                <a:solidFill>
+                  <a:srgbClr val="957BBE"/>
+                </a:solidFill>
+                <a:effectLst>
+                  <a:reflection blurRad="6350" stA="53000" endA="300" endPos="35500" dir="5400000" sy="-90000" algn="bl" rotWithShape="0"/>
+                </a:effectLst>
+              </a:rPr>
+              <a:t> </a:t>
+            </a:r>
+            <a:r>
+              <a:rPr lang="en-US" altLang="ja-JP" b="0" cap="none" spc="0" dirty="0" smtClean="0">
+                <a:ln w="0"/>
+                <a:solidFill>
+                  <a:srgbClr val="957BBE"/>
+                </a:solidFill>
+                <a:effectLst>
+                  <a:reflection blurRad="6350" stA="53000" endA="300" endPos="35500" dir="5400000" sy="-90000" algn="bl" rotWithShape="0"/>
+                </a:effectLst>
+              </a:rPr>
+              <a:t>of</a:t>
+            </a:r>
+            <a:r>
+              <a:rPr lang="en-US" altLang="ja-JP" sz="2800" b="0" cap="none" spc="0" dirty="0" smtClean="0">
+                <a:ln w="0"/>
+                <a:solidFill>
+                  <a:srgbClr val="957BBE"/>
+                </a:solidFill>
+                <a:effectLst>
+                  <a:reflection blurRad="6350" stA="53000" endA="300" endPos="35500" dir="5400000" sy="-90000" algn="bl" rotWithShape="0"/>
+                </a:effectLst>
+              </a:rPr>
+              <a:t>  13</a:t>
+            </a:r>
+            <a:endParaRPr lang="ja-JP" altLang="en-US" sz="2800" b="0" cap="none" spc="0" dirty="0">
+              <a:ln w="0"/>
+              <a:solidFill>
+                <a:srgbClr val="957BBE"/>
+              </a:solidFill>
+              <a:effectLst>
+                <a:reflection blurRad="6350" stA="53000" endA="300" endPos="35500" dir="5400000" sy="-90000" algn="bl" rotWithShape="0"/>
+              </a:effectLst>
+            </a:endParaRPr>
+          </a:p>
+        </p:txBody>
+      </p:sp>
+      <p:sp>
+        <p:nvSpPr>
+          <p:cNvPr id="26" name="コンテンツ プレースホルダー 2"/>
+          <p:cNvSpPr>
+            <a:spLocks noGrp="1"/>
+          </p:cNvSpPr>
+          <p:nvPr>
+            <p:ph sz="half" idx="1"/>
+          </p:nvPr>
+        </p:nvSpPr>
+        <p:spPr>
+          <a:xfrm>
+            <a:off x="1885950" y="2853528"/>
+            <a:ext cx="4133850" cy="546100"/>
+          </a:xfrm>
+        </p:spPr>
+        <p:txBody>
+          <a:bodyPr>
+            <a:normAutofit/>
+          </a:bodyPr>
+          <a:lstStyle/>
+          <a:p>
+            <a:r>
+              <a:rPr kumimoji="1" lang="ja-JP" altLang="en-US" sz="2400" dirty="0" smtClean="0">
+                <a:latin typeface="HGP教科書体" panose="02020600000000000000" pitchFamily="18" charset="-128"/>
+                <a:ea typeface="HGP教科書体" panose="02020600000000000000" pitchFamily="18" charset="-128"/>
+              </a:rPr>
+              <a:t>各機能を展示する</a:t>
+            </a:r>
+            <a:endParaRPr kumimoji="1" lang="ja-JP" altLang="en-US" sz="2400" dirty="0">
+              <a:latin typeface="HGP教科書体" panose="02020600000000000000" pitchFamily="18" charset="-128"/>
+              <a:ea typeface="HGP教科書体" panose="02020600000000000000" pitchFamily="18" charset="-128"/>
+            </a:endParaRPr>
+          </a:p>
+        </p:txBody>
+      </p:sp>
+    </p:spTree>
+    <p:extLst>
+      <p:ext uri="{BB962C8B-B14F-4D97-AF65-F5344CB8AC3E}">
+        <p14:creationId xmlns:p14="http://schemas.microsoft.com/office/powerpoint/2010/main" val="1718279659"/>
+      </p:ext>
+    </p:extLst>
+  </p:cSld>
+  <p:clrMapOvr>
+    <a:masterClrMapping/>
+  </p:clrMapOvr>
+  <p:timing>
+    <p:tnLst>
+      <p:par>
+        <p:cTn id="1" dur="indefinite" restart="never" nodeType="tmRoot"/>
+      </p:par>
+    </p:tnLst>
+  </p:timing>
+</p:sld>
+</file>
+
+<file path=ppt/slides/slide13.xml><?xml version="1.0" encoding="utf-8"?>
+<p:sld xmlns:a="http://schemas.openxmlformats.org/drawingml/2006/main" xmlns:r="http://schemas.openxmlformats.org/officeDocument/2006/relationships" xmlns:p="http://schemas.openxmlformats.org/presentationml/2006/main">
+  <p:cSld>
+    <p:spTree>
+      <p:nvGrpSpPr>
+        <p:cNvPr id="1" name=""/>
+        <p:cNvGrpSpPr/>
+        <p:nvPr/>
+      </p:nvGrpSpPr>
+      <p:grpSpPr>
+        <a:xfrm>
+          <a:off x="0" y="0"/>
+          <a:ext cx="0" cy="0"/>
+          <a:chOff x="0" y="0"/>
+          <a:chExt cx="0" cy="0"/>
+        </a:xfrm>
+      </p:grpSpPr>
+      <p:sp>
+        <p:nvSpPr>
+          <p:cNvPr id="2" name="タイトル 1"/>
+          <p:cNvSpPr>
+            <a:spLocks noGrp="1"/>
+          </p:cNvSpPr>
+          <p:nvPr>
+            <p:ph type="title"/>
+          </p:nvPr>
+        </p:nvSpPr>
+        <p:spPr>
+          <a:xfrm>
+            <a:off x="1885950" y="608209"/>
+            <a:ext cx="9467850" cy="1325563"/>
+          </a:xfrm>
+        </p:spPr>
+        <p:txBody>
+          <a:bodyPr>
+            <a:normAutofit/>
+          </a:bodyPr>
+          <a:lstStyle/>
+          <a:p>
+            <a:r>
+              <a:rPr kumimoji="1" lang="en-US" altLang="ja-JP" sz="3200" dirty="0" smtClean="0">
+                <a:latin typeface="HGP教科書体" panose="02020600000000000000" pitchFamily="18" charset="-128"/>
+                <a:ea typeface="HGP教科書体" panose="02020600000000000000" pitchFamily="18" charset="-128"/>
+              </a:rPr>
+              <a:t>4.</a:t>
+            </a:r>
+            <a:r>
+              <a:rPr kumimoji="1" lang="ja-JP" altLang="en-US" sz="3200" dirty="0" smtClean="0">
+                <a:latin typeface="HGP教科書体" panose="02020600000000000000" pitchFamily="18" charset="-128"/>
+                <a:ea typeface="HGP教科書体" panose="02020600000000000000" pitchFamily="18" charset="-128"/>
+              </a:rPr>
+              <a:t>今後研究の課題</a:t>
+            </a:r>
+            <a:endParaRPr kumimoji="1" lang="ja-JP" altLang="en-US" sz="3200" dirty="0">
+              <a:latin typeface="HGP教科書体" panose="02020600000000000000" pitchFamily="18" charset="-128"/>
+              <a:ea typeface="HGP教科書体" panose="02020600000000000000" pitchFamily="18" charset="-128"/>
+            </a:endParaRPr>
+          </a:p>
+        </p:txBody>
+      </p:sp>
+      <p:grpSp>
+        <p:nvGrpSpPr>
+          <p:cNvPr id="10" name="グループ化 9"/>
+          <p:cNvGrpSpPr/>
+          <p:nvPr/>
+        </p:nvGrpSpPr>
+        <p:grpSpPr>
+          <a:xfrm>
+            <a:off x="954297" y="5448300"/>
+            <a:ext cx="1072730" cy="1001959"/>
+            <a:chOff x="639972" y="481974"/>
+            <a:chExt cx="1072730" cy="1001959"/>
+          </a:xfrm>
+        </p:grpSpPr>
+        <p:grpSp>
+          <p:nvGrpSpPr>
+            <p:cNvPr id="11" name="グループ化 10"/>
+            <p:cNvGrpSpPr/>
+            <p:nvPr/>
+          </p:nvGrpSpPr>
+          <p:grpSpPr>
+            <a:xfrm>
+              <a:off x="762000" y="481974"/>
+              <a:ext cx="809625" cy="776913"/>
+              <a:chOff x="1257300" y="1581150"/>
+              <a:chExt cx="1885950" cy="1809750"/>
+            </a:xfrm>
+          </p:grpSpPr>
+          <p:sp>
+            <p:nvSpPr>
+              <p:cNvPr id="13" name="正方形/長方形 12"/>
+              <p:cNvSpPr/>
+              <p:nvPr/>
+            </p:nvSpPr>
+            <p:spPr>
+              <a:xfrm>
+                <a:off x="1257300" y="1581150"/>
+                <a:ext cx="495300" cy="495300"/>
+              </a:xfrm>
+              <a:prstGeom prst="rect">
+                <a:avLst/>
+              </a:prstGeom>
+              <a:noFill/>
+              <a:ln w="38100">
+                <a:solidFill>
+                  <a:srgbClr val="957BBE">
+                    <a:alpha val="40000"/>
+                  </a:srgbClr>
+                </a:solidFill>
+              </a:ln>
+            </p:spPr>
+            <p:style>
+              <a:lnRef idx="2">
+                <a:schemeClr val="accent1">
+                  <a:shade val="50000"/>
+                </a:schemeClr>
+              </a:lnRef>
+              <a:fillRef idx="1">
+                <a:schemeClr val="accent1"/>
+              </a:fillRef>
+              <a:effectRef idx="0">
+                <a:schemeClr val="accent1"/>
+              </a:effectRef>
+              <a:fontRef idx="minor">
+                <a:schemeClr val="lt1"/>
+              </a:fontRef>
+            </p:style>
+            <p:txBody>
+              <a:bodyPr rtlCol="0" anchor="ctr"/>
+              <a:lstStyle/>
+              <a:p>
+                <a:pPr algn="ctr"/>
+                <a:endParaRPr kumimoji="1" lang="ja-JP" altLang="en-US"/>
+              </a:p>
+            </p:txBody>
+          </p:sp>
+          <p:sp>
+            <p:nvSpPr>
+              <p:cNvPr id="14" name="正方形/長方形 13"/>
+              <p:cNvSpPr/>
+              <p:nvPr/>
+            </p:nvSpPr>
+            <p:spPr>
+              <a:xfrm>
+                <a:off x="1952625" y="1581150"/>
+                <a:ext cx="495300" cy="495300"/>
+              </a:xfrm>
+              <a:prstGeom prst="rect">
+                <a:avLst/>
+              </a:prstGeom>
+              <a:noFill/>
+              <a:ln w="38100">
+                <a:solidFill>
+                  <a:srgbClr val="957BBE">
+                    <a:alpha val="40000"/>
+                  </a:srgbClr>
+                </a:solidFill>
+              </a:ln>
+            </p:spPr>
+            <p:style>
+              <a:lnRef idx="2">
+                <a:schemeClr val="accent1">
+                  <a:shade val="50000"/>
+                </a:schemeClr>
+              </a:lnRef>
+              <a:fillRef idx="1">
+                <a:schemeClr val="accent1"/>
+              </a:fillRef>
+              <a:effectRef idx="0">
+                <a:schemeClr val="accent1"/>
+              </a:effectRef>
+              <a:fontRef idx="minor">
+                <a:schemeClr val="lt1"/>
+              </a:fontRef>
+            </p:style>
+            <p:txBody>
+              <a:bodyPr rtlCol="0" anchor="ctr"/>
+              <a:lstStyle/>
+              <a:p>
+                <a:pPr algn="ctr"/>
+                <a:endParaRPr kumimoji="1" lang="ja-JP" altLang="en-US"/>
+              </a:p>
+            </p:txBody>
+          </p:sp>
+          <p:sp>
+            <p:nvSpPr>
+              <p:cNvPr id="15" name="正方形/長方形 14"/>
+              <p:cNvSpPr/>
+              <p:nvPr/>
+            </p:nvSpPr>
+            <p:spPr>
+              <a:xfrm>
+                <a:off x="2647950" y="1581150"/>
+                <a:ext cx="495300" cy="495300"/>
+              </a:xfrm>
+              <a:prstGeom prst="rect">
+                <a:avLst/>
+              </a:prstGeom>
+              <a:noFill/>
+              <a:ln w="38100">
+                <a:solidFill>
+                  <a:srgbClr val="957BBE">
+                    <a:alpha val="40000"/>
+                  </a:srgbClr>
+                </a:solidFill>
+              </a:ln>
+            </p:spPr>
+            <p:style>
+              <a:lnRef idx="2">
+                <a:schemeClr val="accent1">
+                  <a:shade val="50000"/>
+                </a:schemeClr>
+              </a:lnRef>
+              <a:fillRef idx="1">
+                <a:schemeClr val="accent1"/>
+              </a:fillRef>
+              <a:effectRef idx="0">
+                <a:schemeClr val="accent1"/>
+              </a:effectRef>
+              <a:fontRef idx="minor">
+                <a:schemeClr val="lt1"/>
+              </a:fontRef>
+            </p:style>
+            <p:txBody>
+              <a:bodyPr rtlCol="0" anchor="ctr"/>
+              <a:lstStyle/>
+              <a:p>
+                <a:pPr algn="ctr"/>
+                <a:endParaRPr kumimoji="1" lang="ja-JP" altLang="en-US"/>
+              </a:p>
+            </p:txBody>
+          </p:sp>
+          <p:sp>
+            <p:nvSpPr>
+              <p:cNvPr id="16" name="正方形/長方形 15"/>
+              <p:cNvSpPr/>
+              <p:nvPr/>
+            </p:nvSpPr>
+            <p:spPr>
+              <a:xfrm>
+                <a:off x="2647950" y="2238375"/>
+                <a:ext cx="495300" cy="495300"/>
+              </a:xfrm>
+              <a:prstGeom prst="rect">
+                <a:avLst/>
+              </a:prstGeom>
+              <a:noFill/>
+              <a:ln w="38100">
+                <a:solidFill>
+                  <a:srgbClr val="957BBE">
+                    <a:alpha val="40000"/>
+                  </a:srgbClr>
+                </a:solidFill>
+              </a:ln>
+            </p:spPr>
+            <p:style>
+              <a:lnRef idx="2">
+                <a:schemeClr val="accent1">
+                  <a:shade val="50000"/>
+                </a:schemeClr>
+              </a:lnRef>
+              <a:fillRef idx="1">
+                <a:schemeClr val="accent1"/>
+              </a:fillRef>
+              <a:effectRef idx="0">
+                <a:schemeClr val="accent1"/>
+              </a:effectRef>
+              <a:fontRef idx="minor">
+                <a:schemeClr val="lt1"/>
+              </a:fontRef>
+            </p:style>
+            <p:txBody>
+              <a:bodyPr rtlCol="0" anchor="ctr"/>
+              <a:lstStyle/>
+              <a:p>
+                <a:pPr algn="ctr"/>
+                <a:endParaRPr kumimoji="1" lang="ja-JP" altLang="en-US"/>
+              </a:p>
+            </p:txBody>
+          </p:sp>
+          <p:sp>
+            <p:nvSpPr>
+              <p:cNvPr id="17" name="正方形/長方形 16"/>
+              <p:cNvSpPr/>
+              <p:nvPr/>
+            </p:nvSpPr>
+            <p:spPr>
+              <a:xfrm>
+                <a:off x="1952625" y="2238375"/>
+                <a:ext cx="495300" cy="495300"/>
+              </a:xfrm>
+              <a:prstGeom prst="rect">
+                <a:avLst/>
+              </a:prstGeom>
+              <a:noFill/>
+              <a:ln w="38100">
+                <a:solidFill>
+                  <a:srgbClr val="957BBE">
+                    <a:alpha val="40000"/>
+                  </a:srgbClr>
+                </a:solidFill>
+              </a:ln>
+            </p:spPr>
+            <p:style>
+              <a:lnRef idx="2">
+                <a:schemeClr val="accent1">
+                  <a:shade val="50000"/>
+                </a:schemeClr>
+              </a:lnRef>
+              <a:fillRef idx="1">
+                <a:schemeClr val="accent1"/>
+              </a:fillRef>
+              <a:effectRef idx="0">
+                <a:schemeClr val="accent1"/>
+              </a:effectRef>
+              <a:fontRef idx="minor">
+                <a:schemeClr val="lt1"/>
+              </a:fontRef>
+            </p:style>
+            <p:txBody>
+              <a:bodyPr rtlCol="0" anchor="ctr"/>
+              <a:lstStyle/>
+              <a:p>
+                <a:pPr algn="ctr"/>
+                <a:endParaRPr kumimoji="1" lang="ja-JP" altLang="en-US"/>
+              </a:p>
+            </p:txBody>
+          </p:sp>
+          <p:sp>
+            <p:nvSpPr>
+              <p:cNvPr id="18" name="正方形/長方形 17"/>
+              <p:cNvSpPr/>
+              <p:nvPr/>
+            </p:nvSpPr>
+            <p:spPr>
+              <a:xfrm>
+                <a:off x="1257300" y="2238375"/>
+                <a:ext cx="495300" cy="495300"/>
+              </a:xfrm>
+              <a:prstGeom prst="rect">
+                <a:avLst/>
+              </a:prstGeom>
+              <a:noFill/>
+              <a:ln w="38100">
+                <a:solidFill>
+                  <a:srgbClr val="957BBE">
+                    <a:alpha val="40000"/>
+                  </a:srgbClr>
+                </a:solidFill>
+              </a:ln>
+            </p:spPr>
+            <p:style>
+              <a:lnRef idx="2">
+                <a:schemeClr val="accent1">
+                  <a:shade val="50000"/>
+                </a:schemeClr>
+              </a:lnRef>
+              <a:fillRef idx="1">
+                <a:schemeClr val="accent1"/>
+              </a:fillRef>
+              <a:effectRef idx="0">
+                <a:schemeClr val="accent1"/>
+              </a:effectRef>
+              <a:fontRef idx="minor">
+                <a:schemeClr val="lt1"/>
+              </a:fontRef>
+            </p:style>
+            <p:txBody>
+              <a:bodyPr rtlCol="0" anchor="ctr"/>
+              <a:lstStyle/>
+              <a:p>
+                <a:pPr algn="ctr"/>
+                <a:endParaRPr kumimoji="1" lang="ja-JP" altLang="en-US"/>
+              </a:p>
+            </p:txBody>
+          </p:sp>
+          <p:sp>
+            <p:nvSpPr>
+              <p:cNvPr id="19" name="正方形/長方形 18"/>
+              <p:cNvSpPr/>
+              <p:nvPr/>
+            </p:nvSpPr>
+            <p:spPr>
+              <a:xfrm>
+                <a:off x="1257300" y="2895600"/>
+                <a:ext cx="495300" cy="495300"/>
+              </a:xfrm>
+              <a:prstGeom prst="rect">
+                <a:avLst/>
+              </a:prstGeom>
+              <a:noFill/>
+              <a:ln w="38100">
+                <a:solidFill>
+                  <a:srgbClr val="957BBE">
+                    <a:alpha val="40000"/>
+                  </a:srgbClr>
+                </a:solidFill>
+              </a:ln>
+            </p:spPr>
+            <p:style>
+              <a:lnRef idx="2">
+                <a:schemeClr val="accent1">
+                  <a:shade val="50000"/>
+                </a:schemeClr>
+              </a:lnRef>
+              <a:fillRef idx="1">
+                <a:schemeClr val="accent1"/>
+              </a:fillRef>
+              <a:effectRef idx="0">
+                <a:schemeClr val="accent1"/>
+              </a:effectRef>
+              <a:fontRef idx="minor">
+                <a:schemeClr val="lt1"/>
+              </a:fontRef>
+            </p:style>
+            <p:txBody>
+              <a:bodyPr rtlCol="0" anchor="ctr"/>
+              <a:lstStyle/>
+              <a:p>
+                <a:pPr algn="ctr"/>
+                <a:endParaRPr kumimoji="1" lang="ja-JP" altLang="en-US"/>
+              </a:p>
+            </p:txBody>
+          </p:sp>
+          <p:sp>
+            <p:nvSpPr>
+              <p:cNvPr id="20" name="正方形/長方形 19"/>
+              <p:cNvSpPr/>
+              <p:nvPr/>
+            </p:nvSpPr>
+            <p:spPr>
+              <a:xfrm>
+                <a:off x="1952625" y="2895600"/>
+                <a:ext cx="495300" cy="495300"/>
+              </a:xfrm>
+              <a:prstGeom prst="rect">
+                <a:avLst/>
+              </a:prstGeom>
+              <a:noFill/>
+              <a:ln w="38100">
+                <a:solidFill>
+                  <a:srgbClr val="957BBE">
+                    <a:alpha val="40000"/>
+                  </a:srgbClr>
+                </a:solidFill>
+              </a:ln>
+            </p:spPr>
+            <p:style>
+              <a:lnRef idx="2">
+                <a:schemeClr val="accent1">
+                  <a:shade val="50000"/>
+                </a:schemeClr>
+              </a:lnRef>
+              <a:fillRef idx="1">
+                <a:schemeClr val="accent1"/>
+              </a:fillRef>
+              <a:effectRef idx="0">
+                <a:schemeClr val="accent1"/>
+              </a:effectRef>
+              <a:fontRef idx="minor">
+                <a:schemeClr val="lt1"/>
+              </a:fontRef>
+            </p:style>
+            <p:txBody>
+              <a:bodyPr rtlCol="0" anchor="ctr"/>
+              <a:lstStyle/>
+              <a:p>
+                <a:pPr algn="ctr"/>
+                <a:endParaRPr kumimoji="1" lang="ja-JP" altLang="en-US"/>
+              </a:p>
+            </p:txBody>
+          </p:sp>
+          <p:sp>
+            <p:nvSpPr>
+              <p:cNvPr id="21" name="正方形/長方形 20"/>
+              <p:cNvSpPr/>
+              <p:nvPr/>
+            </p:nvSpPr>
+            <p:spPr>
+              <a:xfrm>
+                <a:off x="2647950" y="2895600"/>
+                <a:ext cx="495300" cy="495300"/>
+              </a:xfrm>
+              <a:prstGeom prst="rect">
+                <a:avLst/>
+              </a:prstGeom>
+              <a:solidFill>
+                <a:srgbClr val="957BBE"/>
+              </a:solidFill>
+              <a:ln w="38100">
+                <a:solidFill>
+                  <a:srgbClr val="957BBE"/>
+                </a:solidFill>
+              </a:ln>
+            </p:spPr>
+            <p:style>
+              <a:lnRef idx="2">
+                <a:schemeClr val="accent1">
+                  <a:shade val="50000"/>
+                </a:schemeClr>
+              </a:lnRef>
+              <a:fillRef idx="1">
+                <a:schemeClr val="accent1"/>
+              </a:fillRef>
+              <a:effectRef idx="0">
+                <a:schemeClr val="accent1"/>
+              </a:effectRef>
+              <a:fontRef idx="minor">
+                <a:schemeClr val="lt1"/>
+              </a:fontRef>
+            </p:style>
+            <p:txBody>
+              <a:bodyPr rtlCol="0" anchor="ctr"/>
+              <a:lstStyle/>
+              <a:p>
+                <a:pPr algn="ctr"/>
+                <a:endParaRPr kumimoji="1" lang="ja-JP" altLang="en-US"/>
+              </a:p>
+            </p:txBody>
+          </p:sp>
+        </p:grpSp>
+        <p:sp>
+          <p:nvSpPr>
+            <p:cNvPr id="12" name="正方形/長方形 11"/>
+            <p:cNvSpPr/>
+            <p:nvPr/>
+          </p:nvSpPr>
+          <p:spPr>
+            <a:xfrm>
+              <a:off x="639972" y="1230017"/>
+              <a:ext cx="1072730" cy="253916"/>
+            </a:xfrm>
+            <a:prstGeom prst="rect">
+              <a:avLst/>
+            </a:prstGeom>
+          </p:spPr>
+          <p:txBody>
+            <a:bodyPr wrap="none">
+              <a:spAutoFit/>
+            </a:bodyPr>
+            <a:lstStyle/>
+            <a:p>
+              <a:r>
+                <a:rPr lang="en-US" altLang="ja-JP" sz="1050" dirty="0" smtClean="0">
+                  <a:solidFill>
+                    <a:srgbClr val="957BBE"/>
+                  </a:solidFill>
+                </a:rPr>
+                <a:t>EVENT</a:t>
+              </a:r>
+              <a:r>
+                <a:rPr lang="ja-JP" altLang="en-US" sz="1050" dirty="0" smtClean="0">
+                  <a:solidFill>
+                    <a:srgbClr val="957BBE"/>
+                  </a:solidFill>
+                </a:rPr>
+                <a:t>　</a:t>
+              </a:r>
+              <a:r>
+                <a:rPr lang="en-US" altLang="ja-JP" sz="1050" dirty="0" smtClean="0">
+                  <a:solidFill>
+                    <a:srgbClr val="957BBE"/>
+                  </a:solidFill>
+                </a:rPr>
+                <a:t>SYSTEM</a:t>
+              </a:r>
+              <a:endParaRPr lang="en-US" altLang="ja-JP" sz="1050" dirty="0">
+                <a:solidFill>
+                  <a:srgbClr val="957BBE"/>
+                </a:solidFill>
+              </a:endParaRPr>
+            </a:p>
+          </p:txBody>
+        </p:sp>
+      </p:grpSp>
+      <p:cxnSp>
+        <p:nvCxnSpPr>
+          <p:cNvPr id="22" name="直線コネクタ 21"/>
+          <p:cNvCxnSpPr/>
+          <p:nvPr/>
+        </p:nvCxnSpPr>
+        <p:spPr>
+          <a:xfrm>
+            <a:off x="1047750" y="5276850"/>
+            <a:ext cx="10086975" cy="0"/>
+          </a:xfrm>
+          <a:prstGeom prst="line">
+            <a:avLst/>
+          </a:prstGeom>
+          <a:ln w="25400">
+            <a:solidFill>
+              <a:srgbClr val="957BBE"/>
+            </a:solidFill>
+          </a:ln>
+        </p:spPr>
+        <p:style>
+          <a:lnRef idx="1">
+            <a:schemeClr val="accent1"/>
+          </a:lnRef>
+          <a:fillRef idx="0">
+            <a:schemeClr val="accent1"/>
+          </a:fillRef>
+          <a:effectRef idx="0">
+            <a:schemeClr val="accent1"/>
+          </a:effectRef>
+          <a:fontRef idx="minor">
+            <a:schemeClr val="tx1"/>
+          </a:fontRef>
+        </p:style>
+      </p:cxnSp>
+      <p:sp>
+        <p:nvSpPr>
+          <p:cNvPr id="23" name="正方形/長方形 22"/>
+          <p:cNvSpPr/>
+          <p:nvPr/>
+        </p:nvSpPr>
+        <p:spPr>
+          <a:xfrm>
             <a:off x="9892076" y="4608257"/>
             <a:ext cx="1415773" cy="584775"/>
           </a:xfrm>
@@ -6668,7 +7620,7 @@
 </p:sld>
 </file>
 
-<file path=ppt/slides/slide13.xml><?xml version="1.0" encoding="utf-8"?>
+<file path=ppt/slides/slide14.xml><?xml version="1.0" encoding="utf-8"?>
 <p:sld xmlns:a="http://schemas.openxmlformats.org/drawingml/2006/main" xmlns:r="http://schemas.openxmlformats.org/officeDocument/2006/relationships" xmlns:p="http://schemas.openxmlformats.org/presentationml/2006/main">
   <p:cSld>
     <p:bg>
@@ -7200,8 +8152,8 @@
         </p:nvSpPr>
         <p:spPr>
           <a:xfrm>
-            <a:off x="1811000" y="2455743"/>
-            <a:ext cx="8401050" cy="646331"/>
+            <a:off x="1811000" y="2623542"/>
+            <a:ext cx="8401050" cy="584775"/>
           </a:xfrm>
           <a:prstGeom prst="rect">
             <a:avLst/>
@@ -7216,20 +8168,20 @@
           <a:p>
             <a:pPr algn="ctr"/>
             <a:r>
-              <a:rPr lang="ja-JP" altLang="en-US" sz="3600" dirty="0">
+              <a:rPr lang="ja-JP" altLang="en-US" sz="3200" dirty="0">
                 <a:latin typeface="HGP教科書体" panose="02020600000000000000" pitchFamily="18" charset="-128"/>
                 <a:ea typeface="HGP教科書体" panose="02020600000000000000" pitchFamily="18" charset="-128"/>
               </a:rPr>
               <a:t>ご清聴ありがとう</a:t>
             </a:r>
             <a:r>
-              <a:rPr lang="ja-JP" altLang="en-US" sz="3600" dirty="0" smtClean="0">
+              <a:rPr lang="ja-JP" altLang="en-US" sz="3200" dirty="0" smtClean="0">
                 <a:latin typeface="HGP教科書体" panose="02020600000000000000" pitchFamily="18" charset="-128"/>
                 <a:ea typeface="HGP教科書体" panose="02020600000000000000" pitchFamily="18" charset="-128"/>
               </a:rPr>
               <a:t>ございました。</a:t>
             </a:r>
-            <a:endParaRPr kumimoji="1" lang="ja-JP" altLang="en-US" sz="3600" dirty="0">
+            <a:endParaRPr kumimoji="1" lang="ja-JP" altLang="en-US" sz="3200" dirty="0">
               <a:latin typeface="HGP教科書体" panose="02020600000000000000" pitchFamily="18" charset="-128"/>
               <a:ea typeface="HGP教科書体" panose="02020600000000000000" pitchFamily="18" charset="-128"/>
             </a:endParaRPr>
@@ -11153,7 +12105,31 @@
                 <a:latin typeface="HGP教科書体" panose="02020600000000000000" pitchFamily="18" charset="-128"/>
                 <a:ea typeface="HGP教科書体" panose="02020600000000000000" pitchFamily="18" charset="-128"/>
               </a:rPr>
-              <a:t>ユーザの画像を表示する</a:t>
+              <a:t>イベント </a:t>
+            </a:r>
+            <a:r>
+              <a:rPr lang="en-US" altLang="ja-JP" sz="2000" kern="100" dirty="0" smtClean="0">
+                <a:effectLst/>
+                <a:latin typeface="HGP教科書体" panose="02020600000000000000" pitchFamily="18" charset="-128"/>
+                <a:ea typeface="HGP教科書体" panose="02020600000000000000" pitchFamily="18" charset="-128"/>
+              </a:rPr>
+              <a:t>/ </a:t>
+            </a:r>
+            <a:r>
+              <a:rPr lang="ja-JP" altLang="en-US" sz="2000" kern="100" dirty="0" smtClean="0">
+                <a:effectLst/>
+                <a:latin typeface="HGP教科書体" panose="02020600000000000000" pitchFamily="18" charset="-128"/>
+                <a:ea typeface="HGP教科書体" panose="02020600000000000000" pitchFamily="18" charset="-128"/>
+              </a:rPr>
+              <a:t>ユーザ</a:t>
+            </a:r>
+            <a:r>
+              <a:rPr lang="ja-JP" altLang="en-US" sz="2000" kern="100" dirty="0" smtClean="0">
+                <a:effectLst/>
+                <a:latin typeface="HGP教科書体" panose="02020600000000000000" pitchFamily="18" charset="-128"/>
+                <a:ea typeface="HGP教科書体" panose="02020600000000000000" pitchFamily="18" charset="-128"/>
+              </a:rPr>
+              <a:t>の画像を表示する</a:t>
             </a:r>
             <a:endParaRPr lang="en-US" altLang="ja-JP" sz="2000" kern="100" dirty="0" smtClean="0">
               <a:effectLst/>
@@ -11210,13 +12186,51 @@
                 <a:latin typeface="HGP教科書体" panose="02020600000000000000" pitchFamily="18" charset="-128"/>
                 <a:ea typeface="HGP教科書体" panose="02020600000000000000" pitchFamily="18" charset="-128"/>
               </a:rPr>
-              <a:t>自分登録したイベント一覧の閲覧</a:t>
-            </a:r>
-            <a:endParaRPr lang="ja-JP" altLang="ja-JP" sz="2000" kern="100" dirty="0" smtClean="0">
-              <a:effectLst/>
+              <a:t>自分登録した</a:t>
+            </a:r>
+            <a:r>
+              <a:rPr lang="ja-JP" altLang="ja-JP" sz="2000" kern="100" dirty="0" smtClean="0">
+                <a:effectLst/>
+                <a:latin typeface="HGP教科書体" panose="02020600000000000000" pitchFamily="18" charset="-128"/>
+                <a:ea typeface="HGP教科書体" panose="02020600000000000000" pitchFamily="18" charset="-128"/>
+              </a:rPr>
+              <a:t>イベント</a:t>
+            </a:r>
+            <a:r>
+              <a:rPr lang="en-US" altLang="ja-JP" sz="2000" kern="100" dirty="0" smtClean="0">
+                <a:effectLst/>
+                <a:latin typeface="HGP教科書体" panose="02020600000000000000" pitchFamily="18" charset="-128"/>
+                <a:ea typeface="HGP教科書体" panose="02020600000000000000" pitchFamily="18" charset="-128"/>
+              </a:rPr>
+              <a:t> / </a:t>
+            </a:r>
+            <a:r>
+              <a:rPr lang="ja-JP" altLang="ja-JP" sz="2000" kern="100" dirty="0" smtClean="0">
+                <a:effectLst/>
+                <a:latin typeface="HGP教科書体" panose="02020600000000000000" pitchFamily="18" charset="-128"/>
+                <a:ea typeface="HGP教科書体" panose="02020600000000000000" pitchFamily="18" charset="-128"/>
+              </a:rPr>
+              <a:t>自分</a:t>
+            </a:r>
+            <a:r>
+              <a:rPr lang="ja-JP" altLang="ja-JP" sz="2000" kern="100" dirty="0" smtClean="0">
+                <a:effectLst/>
+                <a:latin typeface="HGP教科書体" panose="02020600000000000000" pitchFamily="18" charset="-128"/>
+                <a:ea typeface="HGP教科書体" panose="02020600000000000000" pitchFamily="18" charset="-128"/>
+              </a:rPr>
+              <a:t>参加したイベント一覧の</a:t>
+            </a:r>
+            <a:r>
+              <a:rPr lang="ja-JP" altLang="ja-JP" sz="2000" kern="100" dirty="0" smtClean="0">
+                <a:effectLst/>
+                <a:latin typeface="HGP教科書体" panose="02020600000000000000" pitchFamily="18" charset="-128"/>
+                <a:ea typeface="HGP教科書体" panose="02020600000000000000" pitchFamily="18" charset="-128"/>
+              </a:rPr>
+              <a:t>閲覧</a:t>
+            </a:r>
+            <a:endParaRPr lang="en-US" altLang="ja-JP" sz="2000" kern="100" dirty="0">
               <a:latin typeface="HGP教科書体" panose="02020600000000000000" pitchFamily="18" charset="-128"/>
               <a:ea typeface="HGP教科書体" panose="02020600000000000000" pitchFamily="18" charset="-128"/>
-              <a:cs typeface="Times New Roman" panose="02020603050405020304" pitchFamily="18" charset="0"/>
             </a:endParaRPr>
           </a:p>
           <a:p>
@@ -11231,33 +12245,18 @@
               <a:buAutoNum type="arabicPeriod"/>
             </a:pPr>
             <a:r>
-              <a:rPr lang="ja-JP" altLang="ja-JP" sz="2000" kern="100" dirty="0" smtClean="0">
-                <a:effectLst/>
-                <a:latin typeface="HGP教科書体" panose="02020600000000000000" pitchFamily="18" charset="-128"/>
-                <a:ea typeface="HGP教科書体" panose="02020600000000000000" pitchFamily="18" charset="-128"/>
-              </a:rPr>
-              <a:t>自分参加したイベント一覧の閲覧</a:t>
-            </a:r>
-            <a:endParaRPr lang="en-US" altLang="ja-JP" sz="2000" kern="100" dirty="0" smtClean="0">
-              <a:effectLst/>
-              <a:latin typeface="HGP教科書体" panose="02020600000000000000" pitchFamily="18" charset="-128"/>
-              <a:ea typeface="HGP教科書体" panose="02020600000000000000" pitchFamily="18" charset="-128"/>
-            </a:endParaRPr>
-          </a:p>
-          <a:p>
-            <a:pPr marL="342900" indent="-342900" algn="just">
-              <a:lnSpc>
-                <a:spcPct val="150000"/>
-              </a:lnSpc>
-              <a:buFont typeface="+mj-lt"/>
-              <a:buAutoNum type="arabicPeriod" startAt="5"/>
-            </a:pPr>
-            <a:r>
               <a:rPr lang="ja-JP" altLang="en-US" sz="2000" kern="100" dirty="0" smtClean="0">
                 <a:latin typeface="HGP教科書体" panose="02020600000000000000" pitchFamily="18" charset="-128"/>
                 <a:ea typeface="HGP教科書体" panose="02020600000000000000" pitchFamily="18" charset="-128"/>
               </a:rPr>
-              <a:t>イベント一覧で「開催予定のイベント」と「終了したイベント」</a:t>
+              <a:t>イベント</a:t>
+            </a:r>
+            <a:r>
+              <a:rPr lang="ja-JP" altLang="en-US" sz="2000" kern="100" dirty="0" smtClean="0">
+                <a:latin typeface="HGP教科書体" panose="02020600000000000000" pitchFamily="18" charset="-128"/>
+                <a:ea typeface="HGP教科書体" panose="02020600000000000000" pitchFamily="18" charset="-128"/>
+              </a:rPr>
+              <a:t>一覧で「開催予定のイベント」と「終了したイベント」</a:t>
             </a:r>
             <a:r>
               <a:rPr lang="ja-JP" altLang="ja-JP" sz="2000" kern="100" dirty="0" smtClean="0">
@@ -11368,7 +12367,65 @@
                 <a:latin typeface="HGP教科書体" panose="02020600000000000000" pitchFamily="18" charset="-128"/>
                 <a:ea typeface="HGP教科書体" panose="02020600000000000000" pitchFamily="18" charset="-128"/>
               </a:rPr>
-              <a:t>一覧の閲覧</a:t>
+              <a:t>一覧の</a:t>
+            </a:r>
+            <a:r>
+              <a:rPr lang="ja-JP" altLang="ja-JP" sz="2000" kern="100" dirty="0" smtClean="0">
+                <a:effectLst/>
+                <a:latin typeface="HGP教科書体" panose="02020600000000000000" pitchFamily="18" charset="-128"/>
+                <a:ea typeface="HGP教科書体" panose="02020600000000000000" pitchFamily="18" charset="-128"/>
+              </a:rPr>
+              <a:t>閲覧</a:t>
+            </a:r>
+            <a:endParaRPr lang="en-US" altLang="ja-JP" sz="2000" kern="100" dirty="0" smtClean="0">
+              <a:effectLst/>
+              <a:latin typeface="HGP教科書体" panose="02020600000000000000" pitchFamily="18" charset="-128"/>
+              <a:ea typeface="HGP教科書体" panose="02020600000000000000" pitchFamily="18" charset="-128"/>
+            </a:endParaRPr>
+          </a:p>
+          <a:p>
+            <a:pPr marL="342900" indent="-342900" algn="just">
+              <a:lnSpc>
+                <a:spcPct val="150000"/>
+              </a:lnSpc>
+              <a:buFont typeface="+mj-lt"/>
+              <a:buAutoNum type="arabicPeriod" startAt="5"/>
+            </a:pPr>
+            <a:r>
+              <a:rPr lang="en-US" altLang="ja-JP" sz="2000" kern="100" dirty="0" smtClean="0">
+                <a:effectLst/>
+                <a:latin typeface="HGP教科書体" panose="02020600000000000000" pitchFamily="18" charset="-128"/>
+                <a:ea typeface="HGP教科書体" panose="02020600000000000000" pitchFamily="18" charset="-128"/>
+                <a:cs typeface="Times New Roman" panose="02020603050405020304" pitchFamily="18" charset="0"/>
+              </a:rPr>
+              <a:t>Google</a:t>
+            </a:r>
+            <a:r>
+              <a:rPr lang="ja-JP" altLang="en-US" sz="2000" kern="100" dirty="0" smtClean="0">
+                <a:effectLst/>
+                <a:latin typeface="HGP教科書体" panose="02020600000000000000" pitchFamily="18" charset="-128"/>
+                <a:ea typeface="HGP教科書体" panose="02020600000000000000" pitchFamily="18" charset="-128"/>
+                <a:cs typeface="Times New Roman" panose="02020603050405020304" pitchFamily="18" charset="0"/>
+              </a:rPr>
+              <a:t>　</a:t>
+            </a:r>
+            <a:r>
+              <a:rPr lang="en-US" altLang="ja-JP" sz="2000" kern="100" dirty="0" smtClean="0">
+                <a:effectLst/>
+                <a:latin typeface="HGP教科書体" panose="02020600000000000000" pitchFamily="18" charset="-128"/>
+                <a:ea typeface="HGP教科書体" panose="02020600000000000000" pitchFamily="18" charset="-128"/>
+                <a:cs typeface="Times New Roman" panose="02020603050405020304" pitchFamily="18" charset="0"/>
+              </a:rPr>
+              <a:t>Map</a:t>
+            </a:r>
+            <a:r>
+              <a:rPr lang="ja-JP" altLang="en-US" sz="2000" kern="100" dirty="0" smtClean="0">
+                <a:effectLst/>
+                <a:latin typeface="HGP教科書体" panose="02020600000000000000" pitchFamily="18" charset="-128"/>
+                <a:ea typeface="HGP教科書体" panose="02020600000000000000" pitchFamily="18" charset="-128"/>
+                <a:cs typeface="Times New Roman" panose="02020603050405020304" pitchFamily="18" charset="0"/>
+              </a:rPr>
+              <a:t>データを表示する</a:t>
             </a:r>
             <a:endParaRPr lang="ja-JP" altLang="ja-JP" sz="2000" kern="100" dirty="0" smtClean="0">
               <a:effectLst/>

</xml_diff>

<commit_message>
upload fontBomb and edit PPT
</commit_message>
<xml_diff>
--- a/イベントシステム文書/5.Event System(発表用).pptx
+++ b/イベントシステム文書/5.Event System(発表用).pptx
@@ -210,7 +210,7 @@
           <a:p>
             <a:fld id="{297CDE44-0BE5-43B3-822E-DE3FF3C315A3}" type="datetimeFigureOut">
               <a:rPr kumimoji="1" lang="ja-JP" altLang="en-US" smtClean="0"/>
-              <a:t>2019/6/27</a:t>
+              <a:t>2019/6/28</a:t>
             </a:fld>
             <a:endParaRPr kumimoji="1" lang="ja-JP" altLang="en-US"/>
           </a:p>
@@ -729,7 +729,7 @@
           <a:p>
             <a:fld id="{093AC793-4D74-4BF1-8754-552E5CFD7C6D}" type="datetimeFigureOut">
               <a:rPr kumimoji="1" lang="ja-JP" altLang="en-US" smtClean="0"/>
-              <a:t>2019/6/27</a:t>
+              <a:t>2019/6/28</a:t>
             </a:fld>
             <a:endParaRPr kumimoji="1" lang="ja-JP" altLang="en-US"/>
           </a:p>
@@ -931,7 +931,7 @@
           <a:p>
             <a:fld id="{093AC793-4D74-4BF1-8754-552E5CFD7C6D}" type="datetimeFigureOut">
               <a:rPr kumimoji="1" lang="ja-JP" altLang="en-US" smtClean="0"/>
-              <a:t>2019/6/27</a:t>
+              <a:t>2019/6/28</a:t>
             </a:fld>
             <a:endParaRPr kumimoji="1" lang="ja-JP" altLang="en-US"/>
           </a:p>
@@ -1143,7 +1143,7 @@
           <a:p>
             <a:fld id="{093AC793-4D74-4BF1-8754-552E5CFD7C6D}" type="datetimeFigureOut">
               <a:rPr kumimoji="1" lang="ja-JP" altLang="en-US" smtClean="0"/>
-              <a:t>2019/6/27</a:t>
+              <a:t>2019/6/28</a:t>
             </a:fld>
             <a:endParaRPr kumimoji="1" lang="ja-JP" altLang="en-US"/>
           </a:p>
@@ -1345,7 +1345,7 @@
           <a:p>
             <a:fld id="{093AC793-4D74-4BF1-8754-552E5CFD7C6D}" type="datetimeFigureOut">
               <a:rPr kumimoji="1" lang="ja-JP" altLang="en-US" smtClean="0"/>
-              <a:t>2019/6/27</a:t>
+              <a:t>2019/6/28</a:t>
             </a:fld>
             <a:endParaRPr kumimoji="1" lang="ja-JP" altLang="en-US"/>
           </a:p>
@@ -1591,7 +1591,7 @@
           <a:p>
             <a:fld id="{093AC793-4D74-4BF1-8754-552E5CFD7C6D}" type="datetimeFigureOut">
               <a:rPr kumimoji="1" lang="ja-JP" altLang="en-US" smtClean="0"/>
-              <a:t>2019/6/27</a:t>
+              <a:t>2019/6/28</a:t>
             </a:fld>
             <a:endParaRPr kumimoji="1" lang="ja-JP" altLang="en-US"/>
           </a:p>
@@ -1887,7 +1887,7 @@
           <a:p>
             <a:fld id="{093AC793-4D74-4BF1-8754-552E5CFD7C6D}" type="datetimeFigureOut">
               <a:rPr kumimoji="1" lang="ja-JP" altLang="en-US" smtClean="0"/>
-              <a:t>2019/6/27</a:t>
+              <a:t>2019/6/28</a:t>
             </a:fld>
             <a:endParaRPr kumimoji="1" lang="ja-JP" altLang="en-US"/>
           </a:p>
@@ -2318,7 +2318,7 @@
           <a:p>
             <a:fld id="{093AC793-4D74-4BF1-8754-552E5CFD7C6D}" type="datetimeFigureOut">
               <a:rPr kumimoji="1" lang="ja-JP" altLang="en-US" smtClean="0"/>
-              <a:t>2019/6/27</a:t>
+              <a:t>2019/6/28</a:t>
             </a:fld>
             <a:endParaRPr kumimoji="1" lang="ja-JP" altLang="en-US"/>
           </a:p>
@@ -2436,7 +2436,7 @@
           <a:p>
             <a:fld id="{093AC793-4D74-4BF1-8754-552E5CFD7C6D}" type="datetimeFigureOut">
               <a:rPr kumimoji="1" lang="ja-JP" altLang="en-US" smtClean="0"/>
-              <a:t>2019/6/27</a:t>
+              <a:t>2019/6/28</a:t>
             </a:fld>
             <a:endParaRPr kumimoji="1" lang="ja-JP" altLang="en-US"/>
           </a:p>
@@ -2531,7 +2531,7 @@
           <a:p>
             <a:fld id="{093AC793-4D74-4BF1-8754-552E5CFD7C6D}" type="datetimeFigureOut">
               <a:rPr kumimoji="1" lang="ja-JP" altLang="en-US" smtClean="0"/>
-              <a:t>2019/6/27</a:t>
+              <a:t>2019/6/28</a:t>
             </a:fld>
             <a:endParaRPr kumimoji="1" lang="ja-JP" altLang="en-US"/>
           </a:p>
@@ -2840,7 +2840,7 @@
           <a:p>
             <a:fld id="{093AC793-4D74-4BF1-8754-552E5CFD7C6D}" type="datetimeFigureOut">
               <a:rPr kumimoji="1" lang="ja-JP" altLang="en-US" smtClean="0"/>
-              <a:t>2019/6/27</a:t>
+              <a:t>2019/6/28</a:t>
             </a:fld>
             <a:endParaRPr kumimoji="1" lang="ja-JP" altLang="en-US"/>
           </a:p>
@@ -3093,7 +3093,7 @@
           <a:p>
             <a:fld id="{093AC793-4D74-4BF1-8754-552E5CFD7C6D}" type="datetimeFigureOut">
               <a:rPr kumimoji="1" lang="ja-JP" altLang="en-US" smtClean="0"/>
-              <a:t>2019/6/27</a:t>
+              <a:t>2019/6/28</a:t>
             </a:fld>
             <a:endParaRPr kumimoji="1" lang="ja-JP" altLang="en-US"/>
           </a:p>
@@ -3338,7 +3338,7 @@
           <a:p>
             <a:fld id="{093AC793-4D74-4BF1-8754-552E5CFD7C6D}" type="datetimeFigureOut">
               <a:rPr kumimoji="1" lang="ja-JP" altLang="en-US" smtClean="0"/>
-              <a:t>2019/6/27</a:t>
+              <a:t>2019/6/28</a:t>
             </a:fld>
             <a:endParaRPr kumimoji="1" lang="ja-JP" altLang="en-US"/>
           </a:p>
@@ -3778,6 +3778,7 @@
                 <a:solidFill>
                   <a:srgbClr val="957BBE"/>
                 </a:solidFill>
+                <a:latin typeface="+mn-ea"/>
               </a:rPr>
               <a:t>EVENT</a:t>
             </a:r>
@@ -3786,6 +3787,7 @@
                 <a:solidFill>
                   <a:srgbClr val="957BBE"/>
                 </a:solidFill>
+                <a:latin typeface="+mn-ea"/>
               </a:rPr>
               <a:t>　</a:t>
             </a:r>
@@ -3794,6 +3796,7 @@
                 <a:solidFill>
                   <a:srgbClr val="957BBE"/>
                 </a:solidFill>
+                <a:latin typeface="+mn-ea"/>
               </a:rPr>
               <a:t>SYSTEM</a:t>
             </a:r>
@@ -3803,6 +3806,7 @@
               <a:solidFill>
                 <a:srgbClr val="957BBE"/>
               </a:solidFill>
+              <a:latin typeface="+mn-ea"/>
             </a:endParaRPr>
           </a:p>
           <a:p>
@@ -3811,6 +3815,7 @@
                 <a:solidFill>
                   <a:srgbClr val="957BBE"/>
                 </a:solidFill>
+                <a:latin typeface="+mn-ea"/>
               </a:rPr>
               <a:t>ー　ー　発表会　</a:t>
             </a:r>
@@ -3819,6 +3824,7 @@
                 <a:solidFill>
                   <a:srgbClr val="957BBE"/>
                 </a:solidFill>
+                <a:latin typeface="+mn-ea"/>
               </a:rPr>
               <a:t>ー　ー</a:t>
             </a:r>
@@ -3826,6 +3832,7 @@
               <a:solidFill>
                 <a:srgbClr val="957BBE"/>
               </a:solidFill>
+              <a:latin typeface="+mn-ea"/>
             </a:endParaRPr>
           </a:p>
           <a:p>
@@ -3833,6 +3840,7 @@
               <a:solidFill>
                 <a:srgbClr val="957BBE"/>
               </a:solidFill>
+              <a:latin typeface="+mn-ea"/>
             </a:endParaRPr>
           </a:p>
           <a:p>
@@ -3841,6 +3849,7 @@
                 <a:solidFill>
                   <a:srgbClr val="957BBE"/>
                 </a:solidFill>
+                <a:latin typeface="+mn-ea"/>
               </a:rPr>
               <a:t>鈕　皛</a:t>
             </a:r>
@@ -3848,6 +3857,7 @@
               <a:solidFill>
                 <a:srgbClr val="957BBE"/>
               </a:solidFill>
+              <a:latin typeface="+mn-ea"/>
             </a:endParaRPr>
           </a:p>
           <a:p>
@@ -3856,6 +3866,7 @@
                 <a:solidFill>
                   <a:srgbClr val="957BBE"/>
                 </a:solidFill>
+                <a:latin typeface="+mn-ea"/>
               </a:rPr>
               <a:t>2019</a:t>
             </a:r>
@@ -3864,6 +3875,7 @@
                 <a:solidFill>
                   <a:srgbClr val="957BBE"/>
                 </a:solidFill>
+                <a:latin typeface="+mn-ea"/>
               </a:rPr>
               <a:t>年</a:t>
             </a:r>
@@ -3872,6 +3884,7 @@
                 <a:solidFill>
                   <a:srgbClr val="957BBE"/>
                 </a:solidFill>
+                <a:latin typeface="+mn-ea"/>
               </a:rPr>
               <a:t>6</a:t>
             </a:r>
@@ -3880,6 +3893,7 @@
                 <a:solidFill>
                   <a:srgbClr val="957BBE"/>
                 </a:solidFill>
+                <a:latin typeface="+mn-ea"/>
               </a:rPr>
               <a:t>月</a:t>
             </a:r>
@@ -4422,23 +4436,20 @@
             <a:r>
               <a:rPr lang="ja-JP" altLang="en-US" sz="2000" b="1" kern="100" dirty="0" smtClean="0">
                 <a:effectLst/>
-                <a:latin typeface="HGP教科書体" panose="02020600000000000000" pitchFamily="18" charset="-128"/>
-                <a:ea typeface="HGP教科書体" panose="02020600000000000000" pitchFamily="18" charset="-128"/>
+                <a:latin typeface="+mn-ea"/>
               </a:rPr>
               <a:t>最近のイベント（カレンダーで）</a:t>
             </a:r>
             <a:r>
               <a:rPr lang="ja-JP" altLang="ja-JP" sz="2000" b="1" kern="100" dirty="0" smtClean="0">
                 <a:effectLst/>
-                <a:latin typeface="HGP教科書体" panose="02020600000000000000" pitchFamily="18" charset="-128"/>
-                <a:ea typeface="HGP教科書体" panose="02020600000000000000" pitchFamily="18" charset="-128"/>
+                <a:latin typeface="+mn-ea"/>
               </a:rPr>
               <a:t>一覧の閲覧</a:t>
             </a:r>
             <a:endParaRPr lang="en-US" altLang="ja-JP" sz="2000" b="1" kern="100" dirty="0" smtClean="0">
               <a:effectLst/>
-              <a:latin typeface="HGP教科書体" panose="02020600000000000000" pitchFamily="18" charset="-128"/>
-              <a:ea typeface="HGP教科書体" panose="02020600000000000000" pitchFamily="18" charset="-128"/>
+              <a:latin typeface="+mn-ea"/>
             </a:endParaRPr>
           </a:p>
           <a:p>
@@ -4449,14 +4460,12 @@
             </a:pPr>
             <a:r>
               <a:rPr lang="ja-JP" altLang="en-US" sz="2000" kern="100" dirty="0" smtClean="0">
-                <a:latin typeface="HGP教科書体" panose="02020600000000000000" pitchFamily="18" charset="-128"/>
-                <a:ea typeface="HGP教科書体" panose="02020600000000000000" pitchFamily="18" charset="-128"/>
+                <a:latin typeface="+mn-ea"/>
               </a:rPr>
               <a:t>当日の日付に関する前後一週間のイベント情報を表示する。</a:t>
             </a:r>
             <a:endParaRPr lang="en-US" altLang="ja-JP" sz="2000" kern="100" dirty="0">
-              <a:latin typeface="HGP教科書体" panose="02020600000000000000" pitchFamily="18" charset="-128"/>
-              <a:ea typeface="HGP教科書体" panose="02020600000000000000" pitchFamily="18" charset="-128"/>
+              <a:latin typeface="+mn-ea"/>
             </a:endParaRPr>
           </a:p>
         </p:txBody>
@@ -5140,7 +5149,7 @@
         <p:spPr>
           <a:xfrm>
             <a:off x="1779635" y="870649"/>
-            <a:ext cx="8285566" cy="800219"/>
+            <a:ext cx="8285566" cy="755015"/>
           </a:xfrm>
           <a:prstGeom prst="rect">
             <a:avLst/>
@@ -5161,25 +5170,35 @@
               <a:buChar char="•"/>
             </a:pPr>
             <a:r>
+              <a:rPr lang="en-US" altLang="ja-JP" sz="2000" b="1" kern="100" dirty="0" smtClean="0">
+                <a:effectLst/>
+                <a:latin typeface="+mn-ea"/>
+              </a:rPr>
+              <a:t>Google</a:t>
+            </a:r>
+            <a:r>
+              <a:rPr lang="ja-JP" altLang="en-US" sz="2000" b="1" kern="100" dirty="0" smtClean="0">
+                <a:latin typeface="+mn-ea"/>
+              </a:rPr>
+              <a:t> </a:t>
+            </a:r>
+            <a:r>
+              <a:rPr lang="en-US" altLang="ja-JP" sz="2000" b="1" kern="100" dirty="0" smtClean="0">
+                <a:effectLst/>
+                <a:latin typeface="+mn-ea"/>
+              </a:rPr>
+              <a:t>Map</a:t>
+            </a:r>
+            <a:r>
               <a:rPr lang="ja-JP" altLang="en-US" sz="2000" b="1" kern="100" dirty="0" smtClean="0">
                 <a:effectLst/>
-                <a:latin typeface="HGP教科書体" panose="02020600000000000000" pitchFamily="18" charset="-128"/>
-                <a:ea typeface="HGP教科書体" panose="02020600000000000000" pitchFamily="18" charset="-128"/>
-              </a:rPr>
-              <a:t>最近のイベント（カレンダーで）</a:t>
-            </a:r>
-            <a:r>
-              <a:rPr lang="ja-JP" altLang="ja-JP" sz="2000" b="1" kern="100" dirty="0" smtClean="0">
-                <a:effectLst/>
-                <a:latin typeface="HGP教科書体" panose="02020600000000000000" pitchFamily="18" charset="-128"/>
-                <a:ea typeface="HGP教科書体" panose="02020600000000000000" pitchFamily="18" charset="-128"/>
-              </a:rPr>
-              <a:t>一覧の閲覧</a:t>
+                <a:latin typeface="+mn-ea"/>
+              </a:rPr>
+              <a:t>データを表示する</a:t>
             </a:r>
             <a:endParaRPr lang="en-US" altLang="ja-JP" sz="2000" b="1" kern="100" dirty="0" smtClean="0">
               <a:effectLst/>
-              <a:latin typeface="HGP教科書体" panose="02020600000000000000" pitchFamily="18" charset="-128"/>
-              <a:ea typeface="HGP教科書体" panose="02020600000000000000" pitchFamily="18" charset="-128"/>
+              <a:latin typeface="+mn-ea"/>
             </a:endParaRPr>
           </a:p>
           <a:p>
@@ -5189,56 +5208,56 @@
               </a:lnSpc>
             </a:pPr>
             <a:r>
+              <a:rPr lang="ja-JP" altLang="en-US" sz="2000" kern="100" dirty="0" smtClean="0">
+                <a:latin typeface="+mn-ea"/>
+                <a:cs typeface="Times New Roman" panose="02020603050405020304" pitchFamily="18" charset="0"/>
+              </a:rPr>
+              <a:t>イベント</a:t>
+            </a:r>
+            <a:r>
               <a:rPr lang="ja-JP" altLang="en-US" sz="2000" kern="100" dirty="0">
-                <a:latin typeface="HGP教科書体" panose="02020600000000000000" pitchFamily="18" charset="-128"/>
-                <a:ea typeface="HGP教科書体" panose="02020600000000000000" pitchFamily="18" charset="-128"/>
+                <a:latin typeface="+mn-ea"/>
                 <a:cs typeface="Times New Roman" panose="02020603050405020304" pitchFamily="18" charset="0"/>
               </a:rPr>
-              <a:t>イベントの開催された場所に</a:t>
+              <a:t>の開催された場所に</a:t>
             </a:r>
             <a:r>
               <a:rPr lang="ja-JP" altLang="en-US" sz="2000" kern="100" dirty="0" smtClean="0">
-                <a:latin typeface="HGP教科書体" panose="02020600000000000000" pitchFamily="18" charset="-128"/>
-                <a:ea typeface="HGP教科書体" panose="02020600000000000000" pitchFamily="18" charset="-128"/>
+                <a:latin typeface="+mn-ea"/>
                 <a:cs typeface="Times New Roman" panose="02020603050405020304" pitchFamily="18" charset="0"/>
               </a:rPr>
               <a:t>よって</a:t>
             </a:r>
             <a:r>
               <a:rPr lang="en-US" altLang="ja-JP" sz="2000" kern="100" dirty="0" smtClean="0">
-                <a:latin typeface="HGP教科書体" panose="02020600000000000000" pitchFamily="18" charset="-128"/>
-                <a:ea typeface="HGP教科書体" panose="02020600000000000000" pitchFamily="18" charset="-128"/>
+                <a:latin typeface="+mn-ea"/>
                 <a:cs typeface="Times New Roman" panose="02020603050405020304" pitchFamily="18" charset="0"/>
               </a:rPr>
               <a:t>Google</a:t>
             </a:r>
             <a:r>
               <a:rPr lang="ja-JP" altLang="en-US" sz="2000" kern="100" dirty="0">
-                <a:latin typeface="HGP教科書体" panose="02020600000000000000" pitchFamily="18" charset="-128"/>
-                <a:ea typeface="HGP教科書体" panose="02020600000000000000" pitchFamily="18" charset="-128"/>
+                <a:latin typeface="+mn-ea"/>
                 <a:cs typeface="Times New Roman" panose="02020603050405020304" pitchFamily="18" charset="0"/>
               </a:rPr>
               <a:t> </a:t>
             </a:r>
             <a:r>
               <a:rPr lang="en-US" altLang="ja-JP" sz="2000" kern="100" dirty="0" smtClean="0">
-                <a:latin typeface="HGP教科書体" panose="02020600000000000000" pitchFamily="18" charset="-128"/>
-                <a:ea typeface="HGP教科書体" panose="02020600000000000000" pitchFamily="18" charset="-128"/>
+                <a:latin typeface="+mn-ea"/>
                 <a:cs typeface="Times New Roman" panose="02020603050405020304" pitchFamily="18" charset="0"/>
               </a:rPr>
               <a:t>Map</a:t>
             </a:r>
             <a:r>
               <a:rPr lang="ja-JP" altLang="en-US" sz="2000" kern="100" dirty="0" smtClean="0">
-                <a:latin typeface="HGP教科書体" panose="02020600000000000000" pitchFamily="18" charset="-128"/>
-                <a:ea typeface="HGP教科書体" panose="02020600000000000000" pitchFamily="18" charset="-128"/>
+                <a:latin typeface="+mn-ea"/>
                 <a:cs typeface="Times New Roman" panose="02020603050405020304" pitchFamily="18" charset="0"/>
               </a:rPr>
               <a:t>データを表示する。</a:t>
             </a:r>
             <a:endParaRPr lang="en-US" altLang="ja-JP" sz="2000" kern="100" dirty="0">
-              <a:latin typeface="HGP教科書体" panose="02020600000000000000" pitchFamily="18" charset="-128"/>
-              <a:ea typeface="HGP教科書体" panose="02020600000000000000" pitchFamily="18" charset="-128"/>
+              <a:latin typeface="+mn-ea"/>
             </a:endParaRPr>
           </a:p>
         </p:txBody>
@@ -6101,21 +6120,21 @@
           <a:p>
             <a:r>
               <a:rPr kumimoji="1" lang="en-US" altLang="ja-JP" sz="3200" dirty="0" smtClean="0">
-                <a:latin typeface="HGP教科書体" panose="02020600000000000000" pitchFamily="18" charset="-128"/>
-                <a:ea typeface="HGP教科書体" panose="02020600000000000000" pitchFamily="18" charset="-128"/>
+                <a:latin typeface="+mn-ea"/>
+                <a:ea typeface="+mn-ea"/>
               </a:rPr>
               <a:t>3.</a:t>
             </a:r>
             <a:r>
               <a:rPr kumimoji="1" lang="ja-JP" altLang="en-US" sz="3200" dirty="0" smtClean="0">
-                <a:latin typeface="HGP教科書体" panose="02020600000000000000" pitchFamily="18" charset="-128"/>
-                <a:ea typeface="HGP教科書体" panose="02020600000000000000" pitchFamily="18" charset="-128"/>
+                <a:latin typeface="+mn-ea"/>
+                <a:ea typeface="+mn-ea"/>
               </a:rPr>
               <a:t>イベントシステムの展示</a:t>
             </a:r>
             <a:endParaRPr kumimoji="1" lang="ja-JP" altLang="en-US" sz="3200" dirty="0">
-              <a:latin typeface="HGP教科書体" panose="02020600000000000000" pitchFamily="18" charset="-128"/>
-              <a:ea typeface="HGP教科書体" panose="02020600000000000000" pitchFamily="18" charset="-128"/>
+              <a:latin typeface="+mn-ea"/>
+              <a:ea typeface="+mn-ea"/>
             </a:endParaRPr>
           </a:p>
         </p:txBody>
@@ -6777,14 +6796,12 @@
           <a:p>
             <a:r>
               <a:rPr kumimoji="1" lang="ja-JP" altLang="en-US" sz="2400" dirty="0" smtClean="0">
-                <a:latin typeface="HGP教科書体" panose="02020600000000000000" pitchFamily="18" charset="-128"/>
-                <a:ea typeface="HGP教科書体" panose="02020600000000000000" pitchFamily="18" charset="-128"/>
+                <a:latin typeface="+mn-ea"/>
               </a:rPr>
               <a:t>各機能を展示する</a:t>
             </a:r>
             <a:endParaRPr kumimoji="1" lang="ja-JP" altLang="en-US" sz="2400" dirty="0">
-              <a:latin typeface="HGP教科書体" panose="02020600000000000000" pitchFamily="18" charset="-128"/>
-              <a:ea typeface="HGP教科書体" panose="02020600000000000000" pitchFamily="18" charset="-128"/>
+              <a:latin typeface="+mn-ea"/>
             </a:endParaRPr>
           </a:p>
         </p:txBody>
@@ -6838,7 +6855,7 @@
         </p:nvSpPr>
         <p:spPr>
           <a:xfrm>
-            <a:off x="1885950" y="608209"/>
+            <a:off x="1885950" y="368011"/>
             <a:ext cx="9467850" cy="1325563"/>
           </a:xfrm>
         </p:spPr>
@@ -6850,21 +6867,21 @@
           <a:p>
             <a:r>
               <a:rPr kumimoji="1" lang="en-US" altLang="ja-JP" sz="3200" dirty="0" smtClean="0">
-                <a:latin typeface="HGP教科書体" panose="02020600000000000000" pitchFamily="18" charset="-128"/>
-                <a:ea typeface="HGP教科書体" panose="02020600000000000000" pitchFamily="18" charset="-128"/>
+                <a:latin typeface="+mn-ea"/>
+                <a:ea typeface="+mn-ea"/>
               </a:rPr>
               <a:t>4.</a:t>
             </a:r>
             <a:r>
               <a:rPr kumimoji="1" lang="ja-JP" altLang="en-US" sz="3200" dirty="0" smtClean="0">
-                <a:latin typeface="HGP教科書体" panose="02020600000000000000" pitchFamily="18" charset="-128"/>
-                <a:ea typeface="HGP教科書体" panose="02020600000000000000" pitchFamily="18" charset="-128"/>
+                <a:latin typeface="+mn-ea"/>
+                <a:ea typeface="+mn-ea"/>
               </a:rPr>
               <a:t>今後研究の課題</a:t>
             </a:r>
             <a:endParaRPr kumimoji="1" lang="ja-JP" altLang="en-US" sz="3200" dirty="0">
-              <a:latin typeface="HGP教科書体" panose="02020600000000000000" pitchFamily="18" charset="-128"/>
-              <a:ea typeface="HGP教科書体" panose="02020600000000000000" pitchFamily="18" charset="-128"/>
+              <a:latin typeface="+mn-ea"/>
+              <a:ea typeface="+mn-ea"/>
             </a:endParaRPr>
           </a:p>
         </p:txBody>
@@ -7514,7 +7531,7 @@
         </p:nvSpPr>
         <p:spPr>
           <a:xfrm>
-            <a:off x="1885949" y="1713757"/>
+            <a:off x="1885949" y="1473559"/>
             <a:ext cx="8179251" cy="1988540"/>
           </a:xfrm>
         </p:spPr>
@@ -7531,35 +7548,30 @@
             </a:pPr>
             <a:r>
               <a:rPr kumimoji="1" lang="ja-JP" altLang="en-US" sz="2400" dirty="0" smtClean="0">
-                <a:latin typeface="HGP教科書体" panose="02020600000000000000" pitchFamily="18" charset="-128"/>
-                <a:ea typeface="HGP教科書体" panose="02020600000000000000" pitchFamily="18" charset="-128"/>
+                <a:latin typeface="+mn-ea"/>
               </a:rPr>
               <a:t>イベントに関する</a:t>
             </a:r>
             <a:r>
               <a:rPr lang="ja-JP" altLang="en-US" sz="2400" dirty="0">
-                <a:latin typeface="HGP教科書体" panose="02020600000000000000" pitchFamily="18" charset="-128"/>
-                <a:ea typeface="HGP教科書体" panose="02020600000000000000" pitchFamily="18" charset="-128"/>
+                <a:latin typeface="+mn-ea"/>
               </a:rPr>
               <a:t>統計</a:t>
             </a:r>
             <a:r>
               <a:rPr lang="ja-JP" altLang="en-US" sz="2400" dirty="0" smtClean="0">
-                <a:latin typeface="HGP教科書体" panose="02020600000000000000" pitchFamily="18" charset="-128"/>
-                <a:ea typeface="HGP教科書体" panose="02020600000000000000" pitchFamily="18" charset="-128"/>
+                <a:latin typeface="+mn-ea"/>
               </a:rPr>
               <a:t>情報を表示する。参加人数、開催場所など基本的の統計情報</a:t>
             </a:r>
             <a:r>
               <a:rPr lang="ja-JP" altLang="en-US" sz="2400" dirty="0">
-                <a:latin typeface="HGP教科書体" panose="02020600000000000000" pitchFamily="18" charset="-128"/>
-                <a:ea typeface="HGP教科書体" panose="02020600000000000000" pitchFamily="18" charset="-128"/>
+                <a:latin typeface="+mn-ea"/>
               </a:rPr>
               <a:t>；</a:t>
             </a:r>
             <a:endParaRPr kumimoji="1" lang="en-US" altLang="ja-JP" sz="2400" dirty="0" smtClean="0">
-              <a:latin typeface="HGP教科書体" panose="02020600000000000000" pitchFamily="18" charset="-128"/>
-              <a:ea typeface="HGP教科書体" panose="02020600000000000000" pitchFamily="18" charset="-128"/>
+              <a:latin typeface="+mn-ea"/>
             </a:endParaRPr>
           </a:p>
           <a:p>
@@ -7570,14 +7582,12 @@
             </a:pPr>
             <a:r>
               <a:rPr lang="ja-JP" altLang="en-US" sz="2400" dirty="0" smtClean="0">
-                <a:latin typeface="HGP教科書体" panose="02020600000000000000" pitchFamily="18" charset="-128"/>
-                <a:ea typeface="HGP教科書体" panose="02020600000000000000" pitchFamily="18" charset="-128"/>
+                <a:latin typeface="+mn-ea"/>
               </a:rPr>
               <a:t>イベントに関する「投稿」の機能。</a:t>
             </a:r>
             <a:endParaRPr lang="en-US" altLang="ja-JP" sz="2400" dirty="0" smtClean="0">
-              <a:latin typeface="HGP教科書体" panose="02020600000000000000" pitchFamily="18" charset="-128"/>
-              <a:ea typeface="HGP教科書体" panose="02020600000000000000" pitchFamily="18" charset="-128"/>
+              <a:latin typeface="+mn-ea"/>
             </a:endParaRPr>
           </a:p>
           <a:p>
@@ -7588,14 +7598,12 @@
             </a:pPr>
             <a:r>
               <a:rPr lang="ja-JP" altLang="en-US" sz="2400" dirty="0" smtClean="0">
-                <a:latin typeface="HGP教科書体" panose="02020600000000000000" pitchFamily="18" charset="-128"/>
-                <a:ea typeface="HGP教科書体" panose="02020600000000000000" pitchFamily="18" charset="-128"/>
+                <a:latin typeface="+mn-ea"/>
               </a:rPr>
               <a:t>イベントシステムの中でイベントにつきましてユーザの間にメーセージを送信の機能。</a:t>
             </a:r>
             <a:endParaRPr kumimoji="1" lang="ja-JP" altLang="en-US" sz="2400" dirty="0">
-              <a:latin typeface="HGP教科書体" panose="02020600000000000000" pitchFamily="18" charset="-128"/>
-              <a:ea typeface="HGP教科書体" panose="02020600000000000000" pitchFamily="18" charset="-128"/>
+              <a:latin typeface="+mn-ea"/>
             </a:endParaRPr>
           </a:p>
         </p:txBody>
@@ -8169,21 +8177,18 @@
             <a:pPr algn="ctr"/>
             <a:r>
               <a:rPr lang="ja-JP" altLang="en-US" sz="3200" dirty="0">
-                <a:latin typeface="HGP教科書体" panose="02020600000000000000" pitchFamily="18" charset="-128"/>
-                <a:ea typeface="HGP教科書体" panose="02020600000000000000" pitchFamily="18" charset="-128"/>
+                <a:latin typeface="+mn-ea"/>
               </a:rPr>
               <a:t>ご清聴ありがとう</a:t>
             </a:r>
             <a:r>
               <a:rPr lang="ja-JP" altLang="en-US" sz="3200" dirty="0" smtClean="0">
-                <a:latin typeface="HGP教科書体" panose="02020600000000000000" pitchFamily="18" charset="-128"/>
-                <a:ea typeface="HGP教科書体" panose="02020600000000000000" pitchFamily="18" charset="-128"/>
+                <a:latin typeface="+mn-ea"/>
               </a:rPr>
               <a:t>ございました。</a:t>
             </a:r>
             <a:endParaRPr kumimoji="1" lang="ja-JP" altLang="en-US" sz="3200" dirty="0">
-              <a:latin typeface="HGP教科書体" panose="02020600000000000000" pitchFamily="18" charset="-128"/>
-              <a:ea typeface="HGP教科書体" panose="02020600000000000000" pitchFamily="18" charset="-128"/>
+              <a:latin typeface="+mn-ea"/>
             </a:endParaRPr>
           </a:p>
         </p:txBody>
@@ -8882,20 +8887,17 @@
           <a:p>
             <a:r>
               <a:rPr kumimoji="1" lang="ja-JP" altLang="en-US" sz="4000" dirty="0" smtClean="0">
-                <a:latin typeface="HGP教科書体" panose="02020600000000000000" pitchFamily="18" charset="-128"/>
-                <a:ea typeface="HGP教科書体" panose="02020600000000000000" pitchFamily="18" charset="-128"/>
+                <a:latin typeface="+mn-ea"/>
               </a:rPr>
               <a:t>目　次</a:t>
             </a:r>
             <a:endParaRPr kumimoji="1" lang="en-US" altLang="ja-JP" sz="4000" dirty="0" smtClean="0">
-              <a:latin typeface="HGP教科書体" panose="02020600000000000000" pitchFamily="18" charset="-128"/>
-              <a:ea typeface="HGP教科書体" panose="02020600000000000000" pitchFamily="18" charset="-128"/>
+              <a:latin typeface="+mn-ea"/>
             </a:endParaRPr>
           </a:p>
           <a:p>
             <a:endParaRPr lang="en-US" altLang="ja-JP" sz="2000" dirty="0" smtClean="0">
-              <a:latin typeface="HGP教科書体" panose="02020600000000000000" pitchFamily="18" charset="-128"/>
-              <a:ea typeface="HGP教科書体" panose="02020600000000000000" pitchFamily="18" charset="-128"/>
+              <a:latin typeface="+mn-ea"/>
             </a:endParaRPr>
           </a:p>
           <a:p>
@@ -8906,21 +8908,18 @@
             </a:pPr>
             <a:r>
               <a:rPr lang="en-US" altLang="ja-JP" sz="2400" dirty="0" smtClean="0">
-                <a:latin typeface="HGP教科書体" panose="02020600000000000000" pitchFamily="18" charset="-128"/>
-                <a:ea typeface="HGP教科書体" panose="02020600000000000000" pitchFamily="18" charset="-128"/>
+                <a:latin typeface="+mn-ea"/>
               </a:rPr>
               <a:t>1.</a:t>
             </a:r>
             <a:r>
               <a:rPr lang="ja-JP" altLang="en-US" sz="2400" dirty="0" smtClean="0">
-                <a:latin typeface="HGP教科書体" panose="02020600000000000000" pitchFamily="18" charset="-128"/>
-                <a:ea typeface="HGP教科書体" panose="02020600000000000000" pitchFamily="18" charset="-128"/>
-              </a:rPr>
-              <a:t>イベントシステムの概要；</a:t>
+                <a:latin typeface="+mn-ea"/>
+              </a:rPr>
+              <a:t>イベントシステムの概要</a:t>
             </a:r>
             <a:endParaRPr lang="en-US" altLang="ja-JP" sz="2400" dirty="0" smtClean="0">
-              <a:latin typeface="HGP教科書体" panose="02020600000000000000" pitchFamily="18" charset="-128"/>
-              <a:ea typeface="HGP教科書体" panose="02020600000000000000" pitchFamily="18" charset="-128"/>
+              <a:latin typeface="+mn-ea"/>
             </a:endParaRPr>
           </a:p>
           <a:p>
@@ -8931,28 +8930,24 @@
             </a:pPr>
             <a:r>
               <a:rPr kumimoji="1" lang="en-US" altLang="ja-JP" sz="2400" dirty="0">
-                <a:latin typeface="HGP教科書体" panose="02020600000000000000" pitchFamily="18" charset="-128"/>
-                <a:ea typeface="HGP教科書体" panose="02020600000000000000" pitchFamily="18" charset="-128"/>
+                <a:latin typeface="+mn-ea"/>
               </a:rPr>
               <a:t>2</a:t>
             </a:r>
             <a:r>
               <a:rPr kumimoji="1" lang="en-US" altLang="ja-JP" sz="2400" dirty="0" smtClean="0">
-                <a:latin typeface="HGP教科書体" panose="02020600000000000000" pitchFamily="18" charset="-128"/>
-                <a:ea typeface="HGP教科書体" panose="02020600000000000000" pitchFamily="18" charset="-128"/>
+                <a:latin typeface="+mn-ea"/>
               </a:rPr>
               <a:t>.</a:t>
             </a:r>
             <a:r>
               <a:rPr kumimoji="1" lang="ja-JP" altLang="en-US" sz="2400" dirty="0" smtClean="0">
-                <a:latin typeface="HGP教科書体" panose="02020600000000000000" pitchFamily="18" charset="-128"/>
-                <a:ea typeface="HGP教科書体" panose="02020600000000000000" pitchFamily="18" charset="-128"/>
-              </a:rPr>
-              <a:t>機能の紹介；</a:t>
+                <a:latin typeface="+mn-ea"/>
+              </a:rPr>
+              <a:t>機能の紹介</a:t>
             </a:r>
             <a:endParaRPr kumimoji="1" lang="en-US" altLang="ja-JP" sz="2400" dirty="0" smtClean="0">
-              <a:latin typeface="HGP教科書体" panose="02020600000000000000" pitchFamily="18" charset="-128"/>
-              <a:ea typeface="HGP教科書体" panose="02020600000000000000" pitchFamily="18" charset="-128"/>
+              <a:latin typeface="+mn-ea"/>
             </a:endParaRPr>
           </a:p>
           <a:p>
@@ -8963,28 +8958,24 @@
             </a:pPr>
             <a:r>
               <a:rPr lang="en-US" altLang="ja-JP" sz="2400" dirty="0">
-                <a:latin typeface="HGP教科書体" panose="02020600000000000000" pitchFamily="18" charset="-128"/>
-                <a:ea typeface="HGP教科書体" panose="02020600000000000000" pitchFamily="18" charset="-128"/>
+                <a:latin typeface="+mn-ea"/>
               </a:rPr>
               <a:t>3</a:t>
             </a:r>
             <a:r>
               <a:rPr lang="en-US" altLang="ja-JP" sz="2400" dirty="0" smtClean="0">
-                <a:latin typeface="HGP教科書体" panose="02020600000000000000" pitchFamily="18" charset="-128"/>
-                <a:ea typeface="HGP教科書体" panose="02020600000000000000" pitchFamily="18" charset="-128"/>
+                <a:latin typeface="+mn-ea"/>
               </a:rPr>
               <a:t>.</a:t>
             </a:r>
             <a:r>
               <a:rPr lang="ja-JP" altLang="en-US" sz="2400" dirty="0" smtClean="0">
-                <a:latin typeface="HGP教科書体" panose="02020600000000000000" pitchFamily="18" charset="-128"/>
-                <a:ea typeface="HGP教科書体" panose="02020600000000000000" pitchFamily="18" charset="-128"/>
-              </a:rPr>
-              <a:t>イベントシステムの展示；</a:t>
+                <a:latin typeface="+mn-ea"/>
+              </a:rPr>
+              <a:t>イベントシステムの展示</a:t>
             </a:r>
             <a:endParaRPr lang="en-US" altLang="ja-JP" sz="2400" dirty="0" smtClean="0">
-              <a:latin typeface="HGP教科書体" panose="02020600000000000000" pitchFamily="18" charset="-128"/>
-              <a:ea typeface="HGP教科書体" panose="02020600000000000000" pitchFamily="18" charset="-128"/>
+              <a:latin typeface="+mn-ea"/>
             </a:endParaRPr>
           </a:p>
           <a:p>
@@ -8995,42 +8986,36 @@
             </a:pPr>
             <a:r>
               <a:rPr kumimoji="1" lang="en-US" altLang="ja-JP" sz="2400" dirty="0">
-                <a:latin typeface="HGP教科書体" panose="02020600000000000000" pitchFamily="18" charset="-128"/>
-                <a:ea typeface="HGP教科書体" panose="02020600000000000000" pitchFamily="18" charset="-128"/>
+                <a:latin typeface="+mn-ea"/>
               </a:rPr>
               <a:t>4</a:t>
             </a:r>
             <a:r>
               <a:rPr kumimoji="1" lang="en-US" altLang="ja-JP" sz="2400" dirty="0" smtClean="0">
-                <a:latin typeface="HGP教科書体" panose="02020600000000000000" pitchFamily="18" charset="-128"/>
-                <a:ea typeface="HGP教科書体" panose="02020600000000000000" pitchFamily="18" charset="-128"/>
+                <a:latin typeface="+mn-ea"/>
               </a:rPr>
               <a:t>.</a:t>
             </a:r>
             <a:r>
               <a:rPr kumimoji="1" lang="ja-JP" altLang="en-US" sz="2400" dirty="0" smtClean="0">
-                <a:latin typeface="HGP教科書体" panose="02020600000000000000" pitchFamily="18" charset="-128"/>
-                <a:ea typeface="HGP教科書体" panose="02020600000000000000" pitchFamily="18" charset="-128"/>
+                <a:latin typeface="+mn-ea"/>
               </a:rPr>
               <a:t>今後研究</a:t>
             </a:r>
             <a:r>
               <a:rPr lang="ja-JP" altLang="en-US" sz="2400" dirty="0" smtClean="0">
-                <a:latin typeface="HGP教科書体" panose="02020600000000000000" pitchFamily="18" charset="-128"/>
-                <a:ea typeface="HGP教科書体" panose="02020600000000000000" pitchFamily="18" charset="-128"/>
+                <a:latin typeface="+mn-ea"/>
               </a:rPr>
               <a:t>の</a:t>
             </a:r>
             <a:r>
               <a:rPr kumimoji="1" lang="ja-JP" altLang="en-US" sz="2400" dirty="0" smtClean="0">
-                <a:latin typeface="HGP教科書体" panose="02020600000000000000" pitchFamily="18" charset="-128"/>
-                <a:ea typeface="HGP教科書体" panose="02020600000000000000" pitchFamily="18" charset="-128"/>
-              </a:rPr>
-              <a:t>課題。</a:t>
+                <a:latin typeface="+mn-ea"/>
+              </a:rPr>
+              <a:t>課題</a:t>
             </a:r>
             <a:endParaRPr kumimoji="1" lang="ja-JP" altLang="en-US" sz="2400" dirty="0">
-              <a:latin typeface="HGP教科書体" panose="02020600000000000000" pitchFamily="18" charset="-128"/>
-              <a:ea typeface="HGP教科書体" panose="02020600000000000000" pitchFamily="18" charset="-128"/>
+              <a:latin typeface="+mn-ea"/>
             </a:endParaRPr>
           </a:p>
         </p:txBody>
@@ -9096,21 +9081,21 @@
           <a:p>
             <a:r>
               <a:rPr kumimoji="1" lang="en-US" altLang="ja-JP" sz="3200" dirty="0" smtClean="0">
-                <a:latin typeface="HGP教科書体" panose="02020600000000000000" pitchFamily="18" charset="-128"/>
-                <a:ea typeface="HGP教科書体" panose="02020600000000000000" pitchFamily="18" charset="-128"/>
+                <a:latin typeface="+mn-ea"/>
+                <a:ea typeface="+mn-ea"/>
               </a:rPr>
               <a:t>1.</a:t>
             </a:r>
             <a:r>
               <a:rPr kumimoji="1" lang="ja-JP" altLang="en-US" sz="3200" dirty="0" smtClean="0">
-                <a:latin typeface="HGP教科書体" panose="02020600000000000000" pitchFamily="18" charset="-128"/>
-                <a:ea typeface="HGP教科書体" panose="02020600000000000000" pitchFamily="18" charset="-128"/>
+                <a:latin typeface="+mn-ea"/>
+                <a:ea typeface="+mn-ea"/>
               </a:rPr>
               <a:t>イベントシステムの概要</a:t>
             </a:r>
             <a:endParaRPr kumimoji="1" lang="ja-JP" altLang="en-US" sz="3200" dirty="0">
-              <a:latin typeface="HGP教科書体" panose="02020600000000000000" pitchFamily="18" charset="-128"/>
-              <a:ea typeface="HGP教科書体" panose="02020600000000000000" pitchFamily="18" charset="-128"/>
+              <a:latin typeface="+mn-ea"/>
+              <a:ea typeface="+mn-ea"/>
             </a:endParaRPr>
           </a:p>
         </p:txBody>
@@ -9128,7 +9113,7 @@
         <p:spPr>
           <a:xfrm>
             <a:off x="1885950" y="1730375"/>
-            <a:ext cx="8179251" cy="1450975"/>
+            <a:ext cx="8647938" cy="1450975"/>
           </a:xfrm>
         </p:spPr>
         <p:txBody>
@@ -9139,62 +9124,53 @@
           <a:p>
             <a:r>
               <a:rPr lang="ja-JP" altLang="ja-JP" sz="2400" dirty="0">
-                <a:latin typeface="HGP教科書体" panose="02020600000000000000" pitchFamily="18" charset="-128"/>
-                <a:ea typeface="HGP教科書体" panose="02020600000000000000" pitchFamily="18" charset="-128"/>
+                <a:latin typeface="+mn-ea"/>
               </a:rPr>
               <a:t>本システムは、社内やグループ内などで行うイベント情報の共有や</a:t>
             </a:r>
             <a:r>
               <a:rPr lang="ja-JP" altLang="ja-JP" sz="2400" dirty="0" smtClean="0">
-                <a:latin typeface="HGP教科書体" panose="02020600000000000000" pitchFamily="18" charset="-128"/>
-                <a:ea typeface="HGP教科書体" panose="02020600000000000000" pitchFamily="18" charset="-128"/>
+                <a:latin typeface="+mn-ea"/>
               </a:rPr>
               <a:t>、イベント</a:t>
             </a:r>
             <a:r>
               <a:rPr lang="ja-JP" altLang="ja-JP" sz="2400" dirty="0">
-                <a:latin typeface="HGP教科書体" panose="02020600000000000000" pitchFamily="18" charset="-128"/>
-                <a:ea typeface="HGP教科書体" panose="02020600000000000000" pitchFamily="18" charset="-128"/>
+                <a:latin typeface="+mn-ea"/>
               </a:rPr>
               <a:t>参加者の取りまとめを手軽に行う手段を提供する</a:t>
             </a:r>
             <a:r>
               <a:rPr lang="ja-JP" altLang="ja-JP" sz="2400" dirty="0" smtClean="0">
-                <a:latin typeface="HGP教科書体" panose="02020600000000000000" pitchFamily="18" charset="-128"/>
-                <a:ea typeface="HGP教科書体" panose="02020600000000000000" pitchFamily="18" charset="-128"/>
+                <a:latin typeface="+mn-ea"/>
               </a:rPr>
               <a:t>。</a:t>
             </a:r>
             <a:endParaRPr lang="en-US" altLang="ja-JP" sz="2400" dirty="0" smtClean="0">
-              <a:latin typeface="HGP教科書体" panose="02020600000000000000" pitchFamily="18" charset="-128"/>
-              <a:ea typeface="HGP教科書体" panose="02020600000000000000" pitchFamily="18" charset="-128"/>
+              <a:latin typeface="+mn-ea"/>
             </a:endParaRPr>
           </a:p>
           <a:p>
             <a:r>
               <a:rPr lang="ja-JP" altLang="ja-JP" sz="2400" dirty="0" smtClean="0">
-                <a:latin typeface="HGP教科書体" panose="02020600000000000000" pitchFamily="18" charset="-128"/>
-                <a:ea typeface="HGP教科書体" panose="02020600000000000000" pitchFamily="18" charset="-128"/>
+                <a:latin typeface="+mn-ea"/>
               </a:rPr>
               <a:t>本システム</a:t>
             </a:r>
             <a:r>
               <a:rPr lang="ja-JP" altLang="ja-JP" sz="2400" dirty="0">
-                <a:latin typeface="HGP教科書体" panose="02020600000000000000" pitchFamily="18" charset="-128"/>
-                <a:ea typeface="HGP教科書体" panose="02020600000000000000" pitchFamily="18" charset="-128"/>
+                <a:latin typeface="+mn-ea"/>
               </a:rPr>
               <a:t>は、システムに登録されたユーザのみが利用できる</a:t>
             </a:r>
             <a:r>
               <a:rPr lang="ja-JP" altLang="ja-JP" sz="2400" dirty="0" smtClean="0">
-                <a:latin typeface="HGP教科書体" panose="02020600000000000000" pitchFamily="18" charset="-128"/>
-                <a:ea typeface="HGP教科書体" panose="02020600000000000000" pitchFamily="18" charset="-128"/>
+                <a:latin typeface="+mn-ea"/>
               </a:rPr>
               <a:t>。</a:t>
             </a:r>
             <a:endParaRPr lang="en-US" altLang="ja-JP" sz="2400" dirty="0" smtClean="0">
-              <a:latin typeface="HGP教科書体" panose="02020600000000000000" pitchFamily="18" charset="-128"/>
-              <a:ea typeface="HGP教科書体" panose="02020600000000000000" pitchFamily="18" charset="-128"/>
+              <a:latin typeface="+mn-ea"/>
             </a:endParaRPr>
           </a:p>
         </p:txBody>
@@ -9387,14 +9363,12 @@
           <a:p>
             <a:r>
               <a:rPr lang="ja-JP" altLang="ja-JP" sz="2400" dirty="0" smtClean="0">
-                <a:latin typeface="HGP教科書体" panose="02020600000000000000" pitchFamily="18" charset="-128"/>
-                <a:ea typeface="HGP教科書体" panose="02020600000000000000" pitchFamily="18" charset="-128"/>
+                <a:latin typeface="+mn-ea"/>
               </a:rPr>
               <a:t>管理ユーザは、一般ユーザ向けの機能に加え、ユーザ情報を管理する機能を利用できる。</a:t>
             </a:r>
             <a:endParaRPr lang="ja-JP" altLang="ja-JP" sz="2400" dirty="0">
-              <a:latin typeface="HGP教科書体" panose="02020600000000000000" pitchFamily="18" charset="-128"/>
-              <a:ea typeface="HGP教科書体" panose="02020600000000000000" pitchFamily="18" charset="-128"/>
+              <a:latin typeface="+mn-ea"/>
             </a:endParaRPr>
           </a:p>
         </p:txBody>
@@ -9409,7 +9383,7 @@
         </p:nvSpPr>
         <p:spPr>
           <a:xfrm>
-            <a:off x="6248400" y="3274995"/>
+            <a:off x="6339840" y="3239180"/>
             <a:ext cx="3816802" cy="1511691"/>
           </a:xfrm>
           <a:prstGeom prst="rect">
@@ -9587,14 +9561,12 @@
           <a:p>
             <a:r>
               <a:rPr lang="ja-JP" altLang="ja-JP" sz="2400" dirty="0" smtClean="0">
-                <a:latin typeface="HGP教科書体" panose="02020600000000000000" pitchFamily="18" charset="-128"/>
-                <a:ea typeface="HGP教科書体" panose="02020600000000000000" pitchFamily="18" charset="-128"/>
+                <a:latin typeface="+mn-ea"/>
               </a:rPr>
               <a:t>一般ユーザは、イベント情報の閲覧、登録、編集、削除、イベントへの参加表明などを行うことができる。</a:t>
             </a:r>
             <a:endParaRPr lang="en-US" altLang="ja-JP" sz="2400" dirty="0" smtClean="0">
-              <a:latin typeface="HGP教科書体" panose="02020600000000000000" pitchFamily="18" charset="-128"/>
-              <a:ea typeface="HGP教科書体" panose="02020600000000000000" pitchFamily="18" charset="-128"/>
+              <a:latin typeface="+mn-ea"/>
             </a:endParaRPr>
           </a:p>
         </p:txBody>
@@ -10293,28 +10265,28 @@
           <a:p>
             <a:r>
               <a:rPr kumimoji="1" lang="en-US" altLang="ja-JP" sz="3000" dirty="0" smtClean="0">
-                <a:latin typeface="HGP教科書体" panose="02020600000000000000" pitchFamily="18" charset="-128"/>
-                <a:ea typeface="HGP教科書体" panose="02020600000000000000" pitchFamily="18" charset="-128"/>
+                <a:latin typeface="+mn-ea"/>
+                <a:ea typeface="+mn-ea"/>
               </a:rPr>
               <a:t>2.</a:t>
             </a:r>
             <a:r>
               <a:rPr kumimoji="1" lang="ja-JP" altLang="en-US" sz="3200" dirty="0" smtClean="0">
-                <a:latin typeface="HGP教科書体" panose="02020600000000000000" pitchFamily="18" charset="-128"/>
-                <a:ea typeface="HGP教科書体" panose="02020600000000000000" pitchFamily="18" charset="-128"/>
+                <a:latin typeface="+mn-ea"/>
+                <a:ea typeface="+mn-ea"/>
               </a:rPr>
               <a:t>機能</a:t>
             </a:r>
             <a:r>
               <a:rPr kumimoji="1" lang="ja-JP" altLang="en-US" sz="3000" dirty="0" smtClean="0">
-                <a:latin typeface="HGP教科書体" panose="02020600000000000000" pitchFamily="18" charset="-128"/>
-                <a:ea typeface="HGP教科書体" panose="02020600000000000000" pitchFamily="18" charset="-128"/>
+                <a:latin typeface="+mn-ea"/>
+                <a:ea typeface="+mn-ea"/>
               </a:rPr>
               <a:t>紹介</a:t>
             </a:r>
             <a:endParaRPr kumimoji="1" lang="ja-JP" altLang="en-US" sz="3000" dirty="0">
-              <a:latin typeface="HGP教科書体" panose="02020600000000000000" pitchFamily="18" charset="-128"/>
-              <a:ea typeface="HGP教科書体" panose="02020600000000000000" pitchFamily="18" charset="-128"/>
+              <a:latin typeface="+mn-ea"/>
+              <a:ea typeface="+mn-ea"/>
             </a:endParaRPr>
           </a:p>
         </p:txBody>
@@ -10343,14 +10315,12 @@
           <a:p>
             <a:r>
               <a:rPr kumimoji="1" lang="ja-JP" altLang="en-US" sz="2400" b="1" dirty="0" smtClean="0">
-                <a:latin typeface="HGP教科書体" panose="02020600000000000000" pitchFamily="18" charset="-128"/>
-                <a:ea typeface="HGP教科書体" panose="02020600000000000000" pitchFamily="18" charset="-128"/>
-              </a:rPr>
-              <a:t>研修中作成した機能</a:t>
+                <a:latin typeface="+mn-ea"/>
+              </a:rPr>
+              <a:t>研修中に作成した機能</a:t>
             </a:r>
             <a:endParaRPr kumimoji="1" lang="ja-JP" altLang="en-US" sz="2400" b="1" dirty="0">
-              <a:latin typeface="HGP教科書体" panose="02020600000000000000" pitchFamily="18" charset="-128"/>
-              <a:ea typeface="HGP教科書体" panose="02020600000000000000" pitchFamily="18" charset="-128"/>
+              <a:latin typeface="+mn-ea"/>
             </a:endParaRPr>
           </a:p>
         </p:txBody>
@@ -10390,15 +10360,13 @@
             <a:r>
               <a:rPr lang="ja-JP" altLang="ja-JP" sz="2000" kern="100" dirty="0" smtClean="0">
                 <a:effectLst/>
-                <a:latin typeface="HGP教科書体" panose="02020600000000000000" pitchFamily="18" charset="-128"/>
-                <a:ea typeface="HGP教科書体" panose="02020600000000000000" pitchFamily="18" charset="-128"/>
+                <a:latin typeface="+mn-ea"/>
               </a:rPr>
               <a:t>ログイン</a:t>
             </a:r>
             <a:r>
               <a:rPr lang="ja-JP" altLang="en-US" sz="2000" kern="100" dirty="0">
-                <a:latin typeface="HGP教科書体" panose="02020600000000000000" pitchFamily="18" charset="-128"/>
-                <a:ea typeface="HGP教科書体" panose="02020600000000000000" pitchFamily="18" charset="-128"/>
+                <a:latin typeface="+mn-ea"/>
                 <a:cs typeface="Times New Roman" panose="02020603050405020304" pitchFamily="18" charset="0"/>
               </a:rPr>
               <a:t>、</a:t>
@@ -10406,15 +10374,13 @@
             <a:r>
               <a:rPr lang="ja-JP" altLang="ja-JP" sz="2000" kern="100" dirty="0" smtClean="0">
                 <a:effectLst/>
-                <a:latin typeface="HGP教科書体" panose="02020600000000000000" pitchFamily="18" charset="-128"/>
-                <a:ea typeface="HGP教科書体" panose="02020600000000000000" pitchFamily="18" charset="-128"/>
+                <a:latin typeface="+mn-ea"/>
               </a:rPr>
               <a:t>ログアウト</a:t>
             </a:r>
             <a:endParaRPr lang="en-US" altLang="ja-JP" sz="2000" kern="100" dirty="0" smtClean="0">
               <a:effectLst/>
-              <a:latin typeface="HGP教科書体" panose="02020600000000000000" pitchFamily="18" charset="-128"/>
-              <a:ea typeface="HGP教科書体" panose="02020600000000000000" pitchFamily="18" charset="-128"/>
+              <a:latin typeface="+mn-ea"/>
             </a:endParaRPr>
           </a:p>
           <a:p>
@@ -10431,23 +10397,20 @@
             <a:r>
               <a:rPr lang="ja-JP" altLang="en-US" sz="2000" kern="100" dirty="0" smtClean="0">
                 <a:effectLst/>
-                <a:latin typeface="HGP教科書体" panose="02020600000000000000" pitchFamily="18" charset="-128"/>
-                <a:ea typeface="HGP教科書体" panose="02020600000000000000" pitchFamily="18" charset="-128"/>
+                <a:latin typeface="+mn-ea"/>
               </a:rPr>
               <a:t>開催中</a:t>
             </a:r>
             <a:r>
               <a:rPr lang="ja-JP" altLang="ja-JP" sz="2000" kern="100" dirty="0" smtClean="0">
                 <a:effectLst/>
-                <a:latin typeface="HGP教科書体" panose="02020600000000000000" pitchFamily="18" charset="-128"/>
-                <a:ea typeface="HGP教科書体" panose="02020600000000000000" pitchFamily="18" charset="-128"/>
+                <a:latin typeface="+mn-ea"/>
               </a:rPr>
               <a:t>のイベントの閲覧</a:t>
             </a:r>
             <a:endParaRPr lang="ja-JP" altLang="ja-JP" sz="2000" kern="100" dirty="0" smtClean="0">
               <a:effectLst/>
-              <a:latin typeface="HGP教科書体" panose="02020600000000000000" pitchFamily="18" charset="-128"/>
-              <a:ea typeface="HGP教科書体" panose="02020600000000000000" pitchFamily="18" charset="-128"/>
+              <a:latin typeface="+mn-ea"/>
               <a:cs typeface="Times New Roman" panose="02020603050405020304" pitchFamily="18" charset="0"/>
             </a:endParaRPr>
           </a:p>
@@ -10465,15 +10428,13 @@
             <a:r>
               <a:rPr lang="ja-JP" altLang="ja-JP" sz="2000" kern="100" dirty="0" smtClean="0">
                 <a:effectLst/>
-                <a:latin typeface="HGP教科書体" panose="02020600000000000000" pitchFamily="18" charset="-128"/>
-                <a:ea typeface="HGP教科書体" panose="02020600000000000000" pitchFamily="18" charset="-128"/>
+                <a:latin typeface="+mn-ea"/>
               </a:rPr>
               <a:t>イベント一覧の閲覧</a:t>
             </a:r>
             <a:endParaRPr lang="ja-JP" altLang="ja-JP" sz="2000" kern="100" dirty="0" smtClean="0">
               <a:effectLst/>
-              <a:latin typeface="HGP教科書体" panose="02020600000000000000" pitchFamily="18" charset="-128"/>
-              <a:ea typeface="HGP教科書体" panose="02020600000000000000" pitchFamily="18" charset="-128"/>
+              <a:latin typeface="+mn-ea"/>
               <a:cs typeface="Times New Roman" panose="02020603050405020304" pitchFamily="18" charset="0"/>
             </a:endParaRPr>
           </a:p>
@@ -10491,15 +10452,13 @@
             <a:r>
               <a:rPr lang="ja-JP" altLang="ja-JP" sz="2000" kern="100" dirty="0" smtClean="0">
                 <a:effectLst/>
-                <a:latin typeface="HGP教科書体" panose="02020600000000000000" pitchFamily="18" charset="-128"/>
-                <a:ea typeface="HGP教科書体" panose="02020600000000000000" pitchFamily="18" charset="-128"/>
+                <a:latin typeface="+mn-ea"/>
               </a:rPr>
               <a:t>イベント詳細の閲覧</a:t>
             </a:r>
             <a:endParaRPr lang="ja-JP" altLang="ja-JP" sz="2000" kern="100" dirty="0" smtClean="0">
               <a:effectLst/>
-              <a:latin typeface="HGP教科書体" panose="02020600000000000000" pitchFamily="18" charset="-128"/>
-              <a:ea typeface="HGP教科書体" panose="02020600000000000000" pitchFamily="18" charset="-128"/>
+              <a:latin typeface="+mn-ea"/>
               <a:cs typeface="Times New Roman" panose="02020603050405020304" pitchFamily="18" charset="0"/>
             </a:endParaRPr>
           </a:p>
@@ -11173,31 +11132,27 @@
             <a:r>
               <a:rPr lang="ja-JP" altLang="ja-JP" sz="2000" kern="100" dirty="0" smtClean="0">
                 <a:effectLst/>
-                <a:latin typeface="HGP教科書体" panose="02020600000000000000" pitchFamily="18" charset="-128"/>
-                <a:ea typeface="HGP教科書体" panose="02020600000000000000" pitchFamily="18" charset="-128"/>
+                <a:latin typeface="+mn-ea"/>
               </a:rPr>
               <a:t>イベントへの参加表明</a:t>
             </a:r>
             <a:r>
               <a:rPr lang="ja-JP" altLang="en-US" sz="2000" kern="100" dirty="0" smtClean="0">
                 <a:effectLst/>
-                <a:latin typeface="HGP教科書体" panose="02020600000000000000" pitchFamily="18" charset="-128"/>
-                <a:ea typeface="HGP教科書体" panose="02020600000000000000" pitchFamily="18" charset="-128"/>
+                <a:latin typeface="+mn-ea"/>
               </a:rPr>
               <a:t>、</a:t>
             </a:r>
             <a:r>
               <a:rPr lang="ja-JP" altLang="ja-JP" sz="2000" kern="100" dirty="0" smtClean="0">
                 <a:effectLst/>
-                <a:latin typeface="HGP教科書体" panose="02020600000000000000" pitchFamily="18" charset="-128"/>
-                <a:ea typeface="HGP教科書体" panose="02020600000000000000" pitchFamily="18" charset="-128"/>
+                <a:latin typeface="+mn-ea"/>
               </a:rPr>
               <a:t>取り消し</a:t>
             </a:r>
             <a:endParaRPr lang="ja-JP" altLang="ja-JP" sz="2000" kern="100" dirty="0" smtClean="0">
               <a:effectLst/>
-              <a:latin typeface="HGP教科書体" panose="02020600000000000000" pitchFamily="18" charset="-128"/>
-              <a:ea typeface="HGP教科書体" panose="02020600000000000000" pitchFamily="18" charset="-128"/>
+              <a:latin typeface="+mn-ea"/>
               <a:cs typeface="Times New Roman" panose="02020603050405020304" pitchFamily="18" charset="0"/>
             </a:endParaRPr>
           </a:p>
@@ -11215,47 +11170,41 @@
             <a:r>
               <a:rPr lang="ja-JP" altLang="ja-JP" sz="2000" kern="100" dirty="0" smtClean="0">
                 <a:effectLst/>
-                <a:latin typeface="HGP教科書体" panose="02020600000000000000" pitchFamily="18" charset="-128"/>
-                <a:ea typeface="HGP教科書体" panose="02020600000000000000" pitchFamily="18" charset="-128"/>
+                <a:latin typeface="+mn-ea"/>
               </a:rPr>
               <a:t>イベント情報の登録</a:t>
             </a:r>
             <a:r>
               <a:rPr lang="ja-JP" altLang="en-US" sz="2000" kern="100" dirty="0" smtClean="0">
                 <a:effectLst/>
-                <a:latin typeface="HGP教科書体" panose="02020600000000000000" pitchFamily="18" charset="-128"/>
-                <a:ea typeface="HGP教科書体" panose="02020600000000000000" pitchFamily="18" charset="-128"/>
+                <a:latin typeface="+mn-ea"/>
               </a:rPr>
               <a:t>、</a:t>
             </a:r>
             <a:r>
               <a:rPr lang="ja-JP" altLang="ja-JP" sz="2000" kern="100" dirty="0" smtClean="0">
                 <a:effectLst/>
-                <a:latin typeface="HGP教科書体" panose="02020600000000000000" pitchFamily="18" charset="-128"/>
-                <a:ea typeface="HGP教科書体" panose="02020600000000000000" pitchFamily="18" charset="-128"/>
+                <a:latin typeface="+mn-ea"/>
               </a:rPr>
               <a:t>編集</a:t>
             </a:r>
             <a:r>
               <a:rPr lang="ja-JP" altLang="en-US" sz="2000" kern="100" dirty="0" smtClean="0">
                 <a:effectLst/>
-                <a:latin typeface="HGP教科書体" panose="02020600000000000000" pitchFamily="18" charset="-128"/>
-                <a:ea typeface="HGP教科書体" panose="02020600000000000000" pitchFamily="18" charset="-128"/>
+                <a:latin typeface="+mn-ea"/>
               </a:rPr>
               <a:t>、</a:t>
             </a:r>
             <a:r>
               <a:rPr lang="ja-JP" altLang="ja-JP" sz="2000" kern="100" dirty="0" smtClean="0">
                 <a:effectLst/>
-                <a:latin typeface="HGP教科書体" panose="02020600000000000000" pitchFamily="18" charset="-128"/>
-                <a:ea typeface="HGP教科書体" panose="02020600000000000000" pitchFamily="18" charset="-128"/>
+                <a:latin typeface="+mn-ea"/>
               </a:rPr>
               <a:t>削除</a:t>
             </a:r>
             <a:endParaRPr lang="ja-JP" altLang="ja-JP" sz="2000" kern="100" dirty="0" smtClean="0">
               <a:effectLst/>
-              <a:latin typeface="HGP教科書体" panose="02020600000000000000" pitchFamily="18" charset="-128"/>
-              <a:ea typeface="HGP教科書体" panose="02020600000000000000" pitchFamily="18" charset="-128"/>
+              <a:latin typeface="+mn-ea"/>
               <a:cs typeface="Times New Roman" panose="02020603050405020304" pitchFamily="18" charset="0"/>
             </a:endParaRPr>
           </a:p>
@@ -11273,15 +11222,13 @@
             <a:r>
               <a:rPr lang="ja-JP" altLang="ja-JP" sz="2000" kern="100" dirty="0" smtClean="0">
                 <a:effectLst/>
-                <a:latin typeface="HGP教科書体" panose="02020600000000000000" pitchFamily="18" charset="-128"/>
-                <a:ea typeface="HGP教科書体" panose="02020600000000000000" pitchFamily="18" charset="-128"/>
+                <a:latin typeface="+mn-ea"/>
               </a:rPr>
               <a:t>ユーザ一覧の閲覧</a:t>
             </a:r>
             <a:endParaRPr lang="ja-JP" altLang="ja-JP" sz="2000" kern="100" dirty="0" smtClean="0">
               <a:effectLst/>
-              <a:latin typeface="HGP教科書体" panose="02020600000000000000" pitchFamily="18" charset="-128"/>
-              <a:ea typeface="HGP教科書体" panose="02020600000000000000" pitchFamily="18" charset="-128"/>
+              <a:latin typeface="+mn-ea"/>
               <a:cs typeface="Times New Roman" panose="02020603050405020304" pitchFamily="18" charset="0"/>
             </a:endParaRPr>
           </a:p>
@@ -11299,63 +11246,55 @@
             <a:r>
               <a:rPr lang="ja-JP" altLang="ja-JP" sz="2000" kern="100" dirty="0" smtClean="0">
                 <a:effectLst/>
-                <a:latin typeface="HGP教科書体" panose="02020600000000000000" pitchFamily="18" charset="-128"/>
-                <a:ea typeface="HGP教科書体" panose="02020600000000000000" pitchFamily="18" charset="-128"/>
+                <a:latin typeface="+mn-ea"/>
               </a:rPr>
               <a:t>ユーザ詳細の閲覧</a:t>
             </a:r>
             <a:r>
               <a:rPr lang="ja-JP" altLang="en-US" sz="2000" kern="100" dirty="0" smtClean="0">
                 <a:effectLst/>
-                <a:latin typeface="HGP教科書体" panose="02020600000000000000" pitchFamily="18" charset="-128"/>
-                <a:ea typeface="HGP教科書体" panose="02020600000000000000" pitchFamily="18" charset="-128"/>
+                <a:latin typeface="+mn-ea"/>
               </a:rPr>
               <a:t>、</a:t>
             </a:r>
             <a:r>
               <a:rPr lang="ja-JP" altLang="ja-JP" sz="2000" kern="100" dirty="0" smtClean="0">
                 <a:effectLst/>
-                <a:latin typeface="HGP教科書体" panose="02020600000000000000" pitchFamily="18" charset="-128"/>
-                <a:ea typeface="HGP教科書体" panose="02020600000000000000" pitchFamily="18" charset="-128"/>
+                <a:latin typeface="+mn-ea"/>
               </a:rPr>
               <a:t>登録</a:t>
             </a:r>
             <a:r>
               <a:rPr lang="ja-JP" altLang="en-US" sz="2000" kern="100" dirty="0" smtClean="0">
                 <a:effectLst/>
-                <a:latin typeface="HGP教科書体" panose="02020600000000000000" pitchFamily="18" charset="-128"/>
-                <a:ea typeface="HGP教科書体" panose="02020600000000000000" pitchFamily="18" charset="-128"/>
+                <a:latin typeface="+mn-ea"/>
               </a:rPr>
               <a:t>、</a:t>
             </a:r>
             <a:r>
               <a:rPr lang="ja-JP" altLang="ja-JP" sz="2000" kern="100" dirty="0" smtClean="0">
                 <a:effectLst/>
-                <a:latin typeface="HGP教科書体" panose="02020600000000000000" pitchFamily="18" charset="-128"/>
-                <a:ea typeface="HGP教科書体" panose="02020600000000000000" pitchFamily="18" charset="-128"/>
+                <a:latin typeface="+mn-ea"/>
               </a:rPr>
               <a:t>編集</a:t>
             </a:r>
             <a:r>
               <a:rPr lang="ja-JP" altLang="en-US" sz="2000" kern="100" dirty="0" smtClean="0">
                 <a:effectLst/>
-                <a:latin typeface="HGP教科書体" panose="02020600000000000000" pitchFamily="18" charset="-128"/>
-                <a:ea typeface="HGP教科書体" panose="02020600000000000000" pitchFamily="18" charset="-128"/>
+                <a:latin typeface="+mn-ea"/>
               </a:rPr>
               <a:t>、</a:t>
             </a:r>
             <a:r>
               <a:rPr lang="ja-JP" altLang="ja-JP" sz="2000" kern="100" dirty="0" smtClean="0">
                 <a:effectLst/>
-                <a:latin typeface="HGP教科書体" panose="02020600000000000000" pitchFamily="18" charset="-128"/>
-                <a:ea typeface="HGP教科書体" panose="02020600000000000000" pitchFamily="18" charset="-128"/>
+                <a:latin typeface="+mn-ea"/>
               </a:rPr>
               <a:t>削除</a:t>
             </a:r>
             <a:endParaRPr lang="ja-JP" altLang="ja-JP" sz="2000" kern="100" dirty="0" smtClean="0">
               <a:effectLst/>
-              <a:latin typeface="HGP教科書体" panose="02020600000000000000" pitchFamily="18" charset="-128"/>
-              <a:ea typeface="HGP教科書体" panose="02020600000000000000" pitchFamily="18" charset="-128"/>
+              <a:latin typeface="+mn-ea"/>
               <a:cs typeface="Times New Roman" panose="02020603050405020304" pitchFamily="18" charset="0"/>
             </a:endParaRPr>
           </a:p>
@@ -12055,14 +11994,12 @@
           <a:p>
             <a:r>
               <a:rPr lang="ja-JP" altLang="en-US" sz="2400" b="1" dirty="0" smtClean="0">
-                <a:latin typeface="HGP教科書体" panose="02020600000000000000" pitchFamily="18" charset="-128"/>
-                <a:ea typeface="HGP教科書体" panose="02020600000000000000" pitchFamily="18" charset="-128"/>
+                <a:latin typeface="+mn-ea"/>
               </a:rPr>
               <a:t>追加した機能</a:t>
             </a:r>
             <a:endParaRPr lang="ja-JP" altLang="en-US" sz="2400" b="1" dirty="0">
-              <a:latin typeface="HGP教科書体" panose="02020600000000000000" pitchFamily="18" charset="-128"/>
-              <a:ea typeface="HGP教科書体" panose="02020600000000000000" pitchFamily="18" charset="-128"/>
+              <a:latin typeface="+mn-ea"/>
             </a:endParaRPr>
           </a:p>
         </p:txBody>
@@ -12102,39 +12039,27 @@
             <a:r>
               <a:rPr lang="ja-JP" altLang="en-US" sz="2000" kern="100" dirty="0" smtClean="0">
                 <a:effectLst/>
-                <a:latin typeface="HGP教科書体" panose="02020600000000000000" pitchFamily="18" charset="-128"/>
-                <a:ea typeface="HGP教科書体" panose="02020600000000000000" pitchFamily="18" charset="-128"/>
+                <a:latin typeface="+mn-ea"/>
               </a:rPr>
               <a:t>イベント </a:t>
             </a:r>
             <a:r>
               <a:rPr lang="en-US" altLang="ja-JP" sz="2000" kern="100" dirty="0" smtClean="0">
                 <a:effectLst/>
-                <a:latin typeface="HGP教科書体" panose="02020600000000000000" pitchFamily="18" charset="-128"/>
-                <a:ea typeface="HGP教科書体" panose="02020600000000000000" pitchFamily="18" charset="-128"/>
+                <a:latin typeface="+mn-ea"/>
               </a:rPr>
               <a:t>/ </a:t>
             </a:r>
             <a:r>
               <a:rPr lang="ja-JP" altLang="en-US" sz="2000" kern="100" dirty="0" smtClean="0">
                 <a:effectLst/>
-                <a:latin typeface="HGP教科書体" panose="02020600000000000000" pitchFamily="18" charset="-128"/>
-                <a:ea typeface="HGP教科書体" panose="02020600000000000000" pitchFamily="18" charset="-128"/>
-              </a:rPr>
-              <a:t>ユーザ</a:t>
-            </a:r>
-            <a:r>
-              <a:rPr lang="ja-JP" altLang="en-US" sz="2000" kern="100" dirty="0" smtClean="0">
-                <a:effectLst/>
-                <a:latin typeface="HGP教科書体" panose="02020600000000000000" pitchFamily="18" charset="-128"/>
-                <a:ea typeface="HGP教科書体" panose="02020600000000000000" pitchFamily="18" charset="-128"/>
-              </a:rPr>
-              <a:t>の画像を表示する</a:t>
+                <a:latin typeface="+mn-ea"/>
+              </a:rPr>
+              <a:t>ユーザの画像を表示する</a:t>
             </a:r>
             <a:endParaRPr lang="en-US" altLang="ja-JP" sz="2000" kern="100" dirty="0" smtClean="0">
               <a:effectLst/>
-              <a:latin typeface="HGP教科書体" panose="02020600000000000000" pitchFamily="18" charset="-128"/>
-              <a:ea typeface="HGP教科書体" panose="02020600000000000000" pitchFamily="18" charset="-128"/>
+              <a:latin typeface="+mn-ea"/>
             </a:endParaRPr>
           </a:p>
           <a:p>
@@ -12151,22 +12076,19 @@
             <a:r>
               <a:rPr lang="ja-JP" altLang="en-US" sz="2000" kern="100" dirty="0" smtClean="0">
                 <a:effectLst/>
-                <a:latin typeface="HGP教科書体" panose="02020600000000000000" pitchFamily="18" charset="-128"/>
-                <a:ea typeface="HGP教科書体" panose="02020600000000000000" pitchFamily="18" charset="-128"/>
+                <a:latin typeface="+mn-ea"/>
               </a:rPr>
               <a:t>日時入力の</a:t>
             </a:r>
             <a:r>
               <a:rPr lang="ja-JP" altLang="en-US" sz="2000" kern="100" dirty="0" smtClean="0">
-                <a:latin typeface="HGP教科書体" panose="02020600000000000000" pitchFamily="18" charset="-128"/>
-                <a:ea typeface="HGP教科書体" panose="02020600000000000000" pitchFamily="18" charset="-128"/>
+                <a:latin typeface="+mn-ea"/>
               </a:rPr>
               <a:t>選択カレンダーを表示する</a:t>
             </a:r>
             <a:endParaRPr lang="en-US" altLang="ja-JP" sz="2000" kern="100" dirty="0" smtClean="0">
               <a:effectLst/>
-              <a:latin typeface="HGP教科書体" panose="02020600000000000000" pitchFamily="18" charset="-128"/>
-              <a:ea typeface="HGP教科書体" panose="02020600000000000000" pitchFamily="18" charset="-128"/>
+              <a:latin typeface="+mn-ea"/>
             </a:endParaRPr>
           </a:p>
           <a:p>
@@ -12183,54 +12105,67 @@
             <a:r>
               <a:rPr lang="ja-JP" altLang="ja-JP" sz="2000" kern="100" dirty="0" smtClean="0">
                 <a:effectLst/>
-                <a:latin typeface="HGP教科書体" panose="02020600000000000000" pitchFamily="18" charset="-128"/>
-                <a:ea typeface="HGP教科書体" panose="02020600000000000000" pitchFamily="18" charset="-128"/>
-              </a:rPr>
-              <a:t>自分登録した</a:t>
+                <a:latin typeface="+mn-ea"/>
+              </a:rPr>
+              <a:t>自分</a:t>
+            </a:r>
+            <a:r>
+              <a:rPr lang="ja-JP" altLang="en-US" sz="2000" kern="100" dirty="0" smtClean="0">
+                <a:effectLst/>
+                <a:latin typeface="+mn-ea"/>
+              </a:rPr>
+              <a:t>が</a:t>
             </a:r>
             <a:r>
               <a:rPr lang="ja-JP" altLang="ja-JP" sz="2000" kern="100" dirty="0" smtClean="0">
                 <a:effectLst/>
-                <a:latin typeface="HGP教科書体" panose="02020600000000000000" pitchFamily="18" charset="-128"/>
-                <a:ea typeface="HGP教科書体" panose="02020600000000000000" pitchFamily="18" charset="-128"/>
-              </a:rPr>
-              <a:t>イベント</a:t>
+                <a:latin typeface="+mn-ea"/>
+              </a:rPr>
+              <a:t>登録したイベント</a:t>
             </a:r>
             <a:r>
               <a:rPr lang="en-US" altLang="ja-JP" sz="2000" kern="100" dirty="0" smtClean="0">
                 <a:effectLst/>
-                <a:latin typeface="HGP教科書体" panose="02020600000000000000" pitchFamily="18" charset="-128"/>
-                <a:ea typeface="HGP教科書体" panose="02020600000000000000" pitchFamily="18" charset="-128"/>
+                <a:latin typeface="+mn-ea"/>
               </a:rPr>
               <a:t> / </a:t>
             </a:r>
             <a:r>
               <a:rPr lang="ja-JP" altLang="ja-JP" sz="2000" kern="100" dirty="0" smtClean="0">
                 <a:effectLst/>
-                <a:latin typeface="HGP教科書体" panose="02020600000000000000" pitchFamily="18" charset="-128"/>
-                <a:ea typeface="HGP教科書体" panose="02020600000000000000" pitchFamily="18" charset="-128"/>
+                <a:latin typeface="+mn-ea"/>
               </a:rPr>
               <a:t>自分</a:t>
+            </a:r>
+            <a:r>
+              <a:rPr lang="ja-JP" altLang="en-US" sz="2000" kern="100" dirty="0" smtClean="0">
+                <a:effectLst/>
+                <a:latin typeface="+mn-ea"/>
+              </a:rPr>
+              <a:t>が</a:t>
             </a:r>
             <a:r>
               <a:rPr lang="ja-JP" altLang="ja-JP" sz="2000" kern="100" dirty="0" smtClean="0">
                 <a:effectLst/>
-                <a:latin typeface="HGP教科書体" panose="02020600000000000000" pitchFamily="18" charset="-128"/>
-                <a:ea typeface="HGP教科書体" panose="02020600000000000000" pitchFamily="18" charset="-128"/>
-              </a:rPr>
-              <a:t>参加したイベント一覧の</a:t>
+                <a:latin typeface="+mn-ea"/>
+              </a:rPr>
+              <a:t>参加</a:t>
+            </a:r>
+            <a:r>
+              <a:rPr lang="ja-JP" altLang="en-US" sz="2000" kern="100" dirty="0">
+                <a:latin typeface="+mn-ea"/>
+              </a:rPr>
+              <a:t>する</a:t>
             </a:r>
             <a:r>
               <a:rPr lang="ja-JP" altLang="ja-JP" sz="2000" kern="100" dirty="0" smtClean="0">
                 <a:effectLst/>
-                <a:latin typeface="HGP教科書体" panose="02020600000000000000" pitchFamily="18" charset="-128"/>
-                <a:ea typeface="HGP教科書体" panose="02020600000000000000" pitchFamily="18" charset="-128"/>
-              </a:rPr>
-              <a:t>閲覧</a:t>
+                <a:latin typeface="+mn-ea"/>
+              </a:rPr>
+              <a:t>イベント一覧の閲覧</a:t>
             </a:r>
             <a:endParaRPr lang="en-US" altLang="ja-JP" sz="2000" kern="100" dirty="0">
-              <a:latin typeface="HGP教科書体" panose="02020600000000000000" pitchFamily="18" charset="-128"/>
-              <a:ea typeface="HGP教科書体" panose="02020600000000000000" pitchFamily="18" charset="-128"/>
+              <a:latin typeface="+mn-ea"/>
             </a:endParaRPr>
           </a:p>
           <a:p>
@@ -12246,30 +12181,20 @@
             </a:pPr>
             <a:r>
               <a:rPr lang="ja-JP" altLang="en-US" sz="2000" kern="100" dirty="0" smtClean="0">
-                <a:latin typeface="HGP教科書体" panose="02020600000000000000" pitchFamily="18" charset="-128"/>
-                <a:ea typeface="HGP教科書体" panose="02020600000000000000" pitchFamily="18" charset="-128"/>
-              </a:rPr>
-              <a:t>イベント</a:t>
-            </a:r>
-            <a:r>
-              <a:rPr lang="ja-JP" altLang="en-US" sz="2000" kern="100" dirty="0" smtClean="0">
-                <a:latin typeface="HGP教科書体" panose="02020600000000000000" pitchFamily="18" charset="-128"/>
-                <a:ea typeface="HGP教科書体" panose="02020600000000000000" pitchFamily="18" charset="-128"/>
-              </a:rPr>
-              <a:t>一覧で「開催予定のイベント」と「終了したイベント」</a:t>
+                <a:latin typeface="+mn-ea"/>
+              </a:rPr>
+              <a:t>イベント一覧で「開催予定のイベント」と「終了したイベント」</a:t>
             </a:r>
             <a:r>
               <a:rPr lang="ja-JP" altLang="ja-JP" sz="2000" kern="100" dirty="0" smtClean="0">
                 <a:effectLst/>
-                <a:latin typeface="HGP教科書体" panose="02020600000000000000" pitchFamily="18" charset="-128"/>
-                <a:ea typeface="HGP教科書体" panose="02020600000000000000" pitchFamily="18" charset="-128"/>
+                <a:latin typeface="+mn-ea"/>
               </a:rPr>
               <a:t>の閲覧</a:t>
             </a:r>
             <a:endParaRPr lang="en-US" altLang="ja-JP" sz="2000" kern="100" dirty="0" smtClean="0">
               <a:effectLst/>
-              <a:latin typeface="HGP教科書体" panose="02020600000000000000" pitchFamily="18" charset="-128"/>
-              <a:ea typeface="HGP教科書体" panose="02020600000000000000" pitchFamily="18" charset="-128"/>
+              <a:latin typeface="+mn-ea"/>
             </a:endParaRPr>
           </a:p>
           <a:p>
@@ -12283,31 +12208,27 @@
             <a:r>
               <a:rPr lang="ja-JP" altLang="en-US" sz="2000" kern="100" dirty="0" smtClean="0">
                 <a:effectLst/>
-                <a:latin typeface="HGP教科書体" panose="02020600000000000000" pitchFamily="18" charset="-128"/>
-                <a:ea typeface="HGP教科書体" panose="02020600000000000000" pitchFamily="18" charset="-128"/>
+                <a:latin typeface="+mn-ea"/>
               </a:rPr>
               <a:t>イベント一覧とユーザ一覧で</a:t>
             </a:r>
             <a:r>
               <a:rPr lang="ja-JP" altLang="ja-JP" sz="2000" kern="100" dirty="0" smtClean="0">
                 <a:effectLst/>
-                <a:latin typeface="HGP教科書体" panose="02020600000000000000" pitchFamily="18" charset="-128"/>
-                <a:ea typeface="HGP教科書体" panose="02020600000000000000" pitchFamily="18" charset="-128"/>
+                <a:latin typeface="+mn-ea"/>
               </a:rPr>
               <a:t>検索ワード</a:t>
             </a:r>
             <a:r>
               <a:rPr lang="ja-JP" altLang="en-US" sz="2000" kern="100" dirty="0" smtClean="0">
                 <a:effectLst/>
-                <a:latin typeface="HGP教科書体" panose="02020600000000000000" pitchFamily="18" charset="-128"/>
-                <a:ea typeface="HGP教科書体" panose="02020600000000000000" pitchFamily="18" charset="-128"/>
+                <a:latin typeface="+mn-ea"/>
               </a:rPr>
               <a:t>機能</a:t>
             </a:r>
             <a:endParaRPr lang="ja-JP" altLang="ja-JP" sz="2000" kern="100" dirty="0" smtClean="0">
               <a:effectLst/>
-              <a:latin typeface="HGP教科書体" panose="02020600000000000000" pitchFamily="18" charset="-128"/>
-              <a:ea typeface="HGP教科書体" panose="02020600000000000000" pitchFamily="18" charset="-128"/>
+              <a:latin typeface="+mn-ea"/>
               <a:cs typeface="Times New Roman" panose="02020603050405020304" pitchFamily="18" charset="0"/>
             </a:endParaRPr>
           </a:p>
@@ -12325,23 +12246,20 @@
             <a:r>
               <a:rPr lang="ja-JP" altLang="ja-JP" sz="2000" kern="100" dirty="0" smtClean="0">
                 <a:effectLst/>
-                <a:latin typeface="HGP教科書体" panose="02020600000000000000" pitchFamily="18" charset="-128"/>
-                <a:ea typeface="HGP教科書体" panose="02020600000000000000" pitchFamily="18" charset="-128"/>
+                <a:latin typeface="+mn-ea"/>
               </a:rPr>
               <a:t>イベントの登録者にメールを送信する</a:t>
             </a:r>
             <a:r>
               <a:rPr lang="ja-JP" altLang="en-US" sz="2000" kern="100" dirty="0" smtClean="0">
                 <a:effectLst/>
-                <a:latin typeface="HGP教科書体" panose="02020600000000000000" pitchFamily="18" charset="-128"/>
-                <a:ea typeface="HGP教科書体" panose="02020600000000000000" pitchFamily="18" charset="-128"/>
+                <a:latin typeface="+mn-ea"/>
               </a:rPr>
               <a:t>機能</a:t>
             </a:r>
             <a:endParaRPr lang="ja-JP" altLang="ja-JP" sz="2000" kern="100" dirty="0" smtClean="0">
               <a:effectLst/>
-              <a:latin typeface="HGP教科書体" panose="02020600000000000000" pitchFamily="18" charset="-128"/>
-              <a:ea typeface="HGP教科書体" panose="02020600000000000000" pitchFamily="18" charset="-128"/>
+              <a:latin typeface="+mn-ea"/>
               <a:cs typeface="Times New Roman" panose="02020603050405020304" pitchFamily="18" charset="0"/>
             </a:endParaRPr>
           </a:p>
@@ -12356,31 +12274,20 @@
             <a:r>
               <a:rPr lang="ja-JP" altLang="en-US" sz="2000" kern="100" dirty="0" smtClean="0">
                 <a:effectLst/>
-                <a:latin typeface="HGP教科書体" panose="02020600000000000000" pitchFamily="18" charset="-128"/>
-                <a:ea typeface="HGP教科書体" panose="02020600000000000000" pitchFamily="18" charset="-128"/>
+                <a:latin typeface="+mn-ea"/>
               </a:rPr>
               <a:t>最近のイベント（カレンダーで）</a:t>
             </a:r>
             <a:r>
               <a:rPr lang="ja-JP" altLang="ja-JP" sz="2000" kern="100" dirty="0" smtClean="0">
                 <a:effectLst/>
-                <a:latin typeface="HGP教科書体" panose="02020600000000000000" pitchFamily="18" charset="-128"/>
-                <a:ea typeface="HGP教科書体" panose="02020600000000000000" pitchFamily="18" charset="-128"/>
-              </a:rPr>
-              <a:t>一覧の</a:t>
-            </a:r>
-            <a:r>
-              <a:rPr lang="ja-JP" altLang="ja-JP" sz="2000" kern="100" dirty="0" smtClean="0">
-                <a:effectLst/>
-                <a:latin typeface="HGP教科書体" panose="02020600000000000000" pitchFamily="18" charset="-128"/>
-                <a:ea typeface="HGP教科書体" panose="02020600000000000000" pitchFamily="18" charset="-128"/>
-              </a:rPr>
-              <a:t>閲覧</a:t>
+                <a:latin typeface="+mn-ea"/>
+              </a:rPr>
+              <a:t>一覧の閲覧</a:t>
             </a:r>
             <a:endParaRPr lang="en-US" altLang="ja-JP" sz="2000" kern="100" dirty="0" smtClean="0">
               <a:effectLst/>
-              <a:latin typeface="HGP教科書体" panose="02020600000000000000" pitchFamily="18" charset="-128"/>
-              <a:ea typeface="HGP教科書体" panose="02020600000000000000" pitchFamily="18" charset="-128"/>
+              <a:latin typeface="+mn-ea"/>
             </a:endParaRPr>
           </a:p>
           <a:p>
@@ -12394,8 +12301,7 @@
             <a:r>
               <a:rPr lang="en-US" altLang="ja-JP" sz="2000" kern="100" dirty="0" smtClean="0">
                 <a:effectLst/>
-                <a:latin typeface="HGP教科書体" panose="02020600000000000000" pitchFamily="18" charset="-128"/>
-                <a:ea typeface="HGP教科書体" panose="02020600000000000000" pitchFamily="18" charset="-128"/>
+                <a:latin typeface="+mn-ea"/>
                 <a:cs typeface="Times New Roman" panose="02020603050405020304" pitchFamily="18" charset="0"/>
               </a:rPr>
               <a:t>Google</a:t>
@@ -12403,8 +12309,7 @@
             <a:r>
               <a:rPr lang="ja-JP" altLang="en-US" sz="2000" kern="100" dirty="0" smtClean="0">
                 <a:effectLst/>
-                <a:latin typeface="HGP教科書体" panose="02020600000000000000" pitchFamily="18" charset="-128"/>
-                <a:ea typeface="HGP教科書体" panose="02020600000000000000" pitchFamily="18" charset="-128"/>
+                <a:latin typeface="+mn-ea"/>
                 <a:cs typeface="Times New Roman" panose="02020603050405020304" pitchFamily="18" charset="0"/>
               </a:rPr>
               <a:t>　</a:t>
@@ -12412,8 +12317,7 @@
             <a:r>
               <a:rPr lang="en-US" altLang="ja-JP" sz="2000" kern="100" dirty="0" smtClean="0">
                 <a:effectLst/>
-                <a:latin typeface="HGP教科書体" panose="02020600000000000000" pitchFamily="18" charset="-128"/>
-                <a:ea typeface="HGP教科書体" panose="02020600000000000000" pitchFamily="18" charset="-128"/>
+                <a:latin typeface="+mn-ea"/>
                 <a:cs typeface="Times New Roman" panose="02020603050405020304" pitchFamily="18" charset="0"/>
               </a:rPr>
               <a:t>Map</a:t>
@@ -12421,16 +12325,14 @@
             <a:r>
               <a:rPr lang="ja-JP" altLang="en-US" sz="2000" kern="100" dirty="0" smtClean="0">
                 <a:effectLst/>
-                <a:latin typeface="HGP教科書体" panose="02020600000000000000" pitchFamily="18" charset="-128"/>
-                <a:ea typeface="HGP教科書体" panose="02020600000000000000" pitchFamily="18" charset="-128"/>
+                <a:latin typeface="+mn-ea"/>
                 <a:cs typeface="Times New Roman" panose="02020603050405020304" pitchFamily="18" charset="0"/>
               </a:rPr>
               <a:t>データを表示する</a:t>
             </a:r>
             <a:endParaRPr lang="ja-JP" altLang="ja-JP" sz="2000" kern="100" dirty="0" smtClean="0">
               <a:effectLst/>
-              <a:latin typeface="HGP教科書体" panose="02020600000000000000" pitchFamily="18" charset="-128"/>
-              <a:ea typeface="HGP教科書体" panose="02020600000000000000" pitchFamily="18" charset="-128"/>
+              <a:latin typeface="+mn-ea"/>
               <a:cs typeface="Times New Roman" panose="02020603050405020304" pitchFamily="18" charset="0"/>
             </a:endParaRPr>
           </a:p>
@@ -12497,20 +12399,17 @@
           <a:p>
             <a:r>
               <a:rPr lang="ja-JP" altLang="en-US" sz="2400" dirty="0" smtClean="0">
-                <a:latin typeface="HGP教科書体" panose="02020600000000000000" pitchFamily="18" charset="-128"/>
-                <a:ea typeface="HGP教科書体" panose="02020600000000000000" pitchFamily="18" charset="-128"/>
+                <a:latin typeface="+mn-ea"/>
               </a:rPr>
               <a:t>追加した機能の設計</a:t>
             </a:r>
             <a:endParaRPr lang="ja-JP" altLang="en-US" sz="2400" dirty="0">
-              <a:latin typeface="HGP教科書体" panose="02020600000000000000" pitchFamily="18" charset="-128"/>
-              <a:ea typeface="HGP教科書体" panose="02020600000000000000" pitchFamily="18" charset="-128"/>
+              <a:latin typeface="+mn-ea"/>
             </a:endParaRPr>
           </a:p>
           <a:p>
             <a:endParaRPr kumimoji="1" lang="ja-JP" altLang="en-US" sz="2400" dirty="0">
-              <a:latin typeface="HGP教科書体" panose="02020600000000000000" pitchFamily="18" charset="-128"/>
-              <a:ea typeface="HGP教科書体" panose="02020600000000000000" pitchFamily="18" charset="-128"/>
+              <a:latin typeface="+mn-ea"/>
             </a:endParaRPr>
           </a:p>
         </p:txBody>
@@ -12550,15 +12449,13 @@
             <a:r>
               <a:rPr lang="ja-JP" altLang="en-US" sz="2000" b="1" kern="100" dirty="0" smtClean="0">
                 <a:effectLst/>
-                <a:latin typeface="HGP教科書体" panose="02020600000000000000" pitchFamily="18" charset="-128"/>
-                <a:ea typeface="HGP教科書体" panose="02020600000000000000" pitchFamily="18" charset="-128"/>
+                <a:latin typeface="+mn-ea"/>
               </a:rPr>
               <a:t>ユーザの画像を表示する。</a:t>
             </a:r>
             <a:endParaRPr lang="en-US" altLang="ja-JP" sz="2000" b="1" kern="100" dirty="0" smtClean="0">
               <a:effectLst/>
-              <a:latin typeface="HGP教科書体" panose="02020600000000000000" pitchFamily="18" charset="-128"/>
-              <a:ea typeface="HGP教科書体" panose="02020600000000000000" pitchFamily="18" charset="-128"/>
+              <a:latin typeface="+mn-ea"/>
             </a:endParaRPr>
           </a:p>
           <a:p>
@@ -12572,14 +12469,12 @@
             </a:pPr>
             <a:r>
               <a:rPr lang="ja-JP" altLang="en-US" sz="2000" kern="100" dirty="0" smtClean="0">
-                <a:latin typeface="HGP教科書体" panose="02020600000000000000" pitchFamily="18" charset="-128"/>
-                <a:ea typeface="HGP教科書体" panose="02020600000000000000" pitchFamily="18" charset="-128"/>
-              </a:rPr>
-              <a:t>ユーザ登録する時、ユーザの画像登録する機能。画像登録した場合はメニュー側で表示する。登録しない場合は、暗黙的の画像を配置する。</a:t>
+                <a:latin typeface="+mn-ea"/>
+              </a:rPr>
+              <a:t>ユーザ登録する時、ユーザの画像登録する機能。画像登録した場合はメニュー側で表示する。何も登録しない場合は、初期設定の画像になる。</a:t>
             </a:r>
             <a:endParaRPr lang="en-US" altLang="ja-JP" sz="2000" kern="100" dirty="0" smtClean="0">
-              <a:latin typeface="HGP教科書体" panose="02020600000000000000" pitchFamily="18" charset="-128"/>
-              <a:ea typeface="HGP教科書体" panose="02020600000000000000" pitchFamily="18" charset="-128"/>
+              <a:latin typeface="+mn-ea"/>
             </a:endParaRPr>
           </a:p>
           <a:p>
@@ -12592,8 +12487,7 @@
               </a:spcAft>
             </a:pPr>
             <a:endParaRPr lang="en-US" altLang="ja-JP" sz="2000" kern="100" dirty="0">
-              <a:latin typeface="HGP教科書体" panose="02020600000000000000" pitchFamily="18" charset="-128"/>
-              <a:ea typeface="HGP教科書体" panose="02020600000000000000" pitchFamily="18" charset="-128"/>
+              <a:latin typeface="+mn-ea"/>
             </a:endParaRPr>
           </a:p>
           <a:p>
@@ -12607,8 +12501,7 @@
             </a:pPr>
             <a:endParaRPr lang="en-US" altLang="ja-JP" sz="2000" kern="100" dirty="0" smtClean="0">
               <a:effectLst/>
-              <a:latin typeface="HGP教科書体" panose="02020600000000000000" pitchFamily="18" charset="-128"/>
-              <a:ea typeface="HGP教科書体" panose="02020600000000000000" pitchFamily="18" charset="-128"/>
+              <a:latin typeface="+mn-ea"/>
             </a:endParaRPr>
           </a:p>
           <a:p>
@@ -12625,21 +12518,18 @@
             <a:r>
               <a:rPr lang="ja-JP" altLang="en-US" sz="2000" b="1" kern="100" dirty="0" smtClean="0">
                 <a:effectLst/>
-                <a:latin typeface="HGP教科書体" panose="02020600000000000000" pitchFamily="18" charset="-128"/>
-                <a:ea typeface="HGP教科書体" panose="02020600000000000000" pitchFamily="18" charset="-128"/>
-              </a:rPr>
-              <a:t>日時入力の方</a:t>
+                <a:latin typeface="+mn-ea"/>
+              </a:rPr>
+              <a:t>日時入力時</a:t>
             </a:r>
             <a:r>
               <a:rPr lang="ja-JP" altLang="en-US" sz="2000" b="1" kern="100" dirty="0" smtClean="0">
-                <a:latin typeface="HGP教科書体" panose="02020600000000000000" pitchFamily="18" charset="-128"/>
-                <a:ea typeface="HGP教科書体" panose="02020600000000000000" pitchFamily="18" charset="-128"/>
+                <a:latin typeface="+mn-ea"/>
               </a:rPr>
               <a:t>選択カレンダーと時間表を表示する。</a:t>
             </a:r>
             <a:endParaRPr lang="en-US" altLang="ja-JP" sz="2000" b="1" kern="100" dirty="0" smtClean="0">
-              <a:latin typeface="HGP教科書体" panose="02020600000000000000" pitchFamily="18" charset="-128"/>
-              <a:ea typeface="HGP教科書体" panose="02020600000000000000" pitchFamily="18" charset="-128"/>
+              <a:latin typeface="+mn-ea"/>
             </a:endParaRPr>
           </a:p>
           <a:p>
@@ -12654,38 +12544,33 @@
             <a:r>
               <a:rPr lang="ja-JP" altLang="en-US" sz="2000" kern="100" dirty="0" smtClean="0">
                 <a:effectLst/>
-                <a:latin typeface="HGP教科書体" panose="02020600000000000000" pitchFamily="18" charset="-128"/>
-                <a:ea typeface="HGP教科書体" panose="02020600000000000000" pitchFamily="18" charset="-128"/>
+                <a:latin typeface="+mn-ea"/>
               </a:rPr>
               <a:t>イベント</a:t>
             </a:r>
             <a:r>
               <a:rPr lang="ja-JP" altLang="ja-JP" sz="2000" kern="100" dirty="0" smtClean="0">
                 <a:effectLst/>
-                <a:latin typeface="HGP教科書体" panose="02020600000000000000" pitchFamily="18" charset="-128"/>
-                <a:ea typeface="HGP教科書体" panose="02020600000000000000" pitchFamily="18" charset="-128"/>
+                <a:latin typeface="+mn-ea"/>
               </a:rPr>
               <a:t>登録</a:t>
             </a:r>
             <a:r>
               <a:rPr lang="ja-JP" altLang="en-US" sz="2000" kern="100" dirty="0" smtClean="0">
                 <a:effectLst/>
-                <a:latin typeface="HGP教科書体" panose="02020600000000000000" pitchFamily="18" charset="-128"/>
-                <a:ea typeface="HGP教科書体" panose="02020600000000000000" pitchFamily="18" charset="-128"/>
+                <a:latin typeface="+mn-ea"/>
               </a:rPr>
               <a:t>の場合は「開始日時」と「終了日時」のところを押すとカレンダー選択項目を表示する。指定した日時を</a:t>
             </a:r>
             <a:r>
               <a:rPr lang="ja-JP" altLang="en-US" sz="2000" kern="100" dirty="0" smtClean="0">
-                <a:latin typeface="HGP教科書体" panose="02020600000000000000" pitchFamily="18" charset="-128"/>
-                <a:ea typeface="HGP教科書体" panose="02020600000000000000" pitchFamily="18" charset="-128"/>
+                <a:latin typeface="+mn-ea"/>
               </a:rPr>
               <a:t>選べる。</a:t>
             </a:r>
             <a:endParaRPr lang="en-US" altLang="ja-JP" sz="2000" kern="100" dirty="0" smtClean="0">
               <a:effectLst/>
-              <a:latin typeface="HGP教科書体" panose="02020600000000000000" pitchFamily="18" charset="-128"/>
-              <a:ea typeface="HGP教科書体" panose="02020600000000000000" pitchFamily="18" charset="-128"/>
+              <a:latin typeface="+mn-ea"/>
             </a:endParaRPr>
           </a:p>
         </p:txBody>
@@ -13477,7 +13362,7 @@
         <p:spPr>
           <a:xfrm>
             <a:off x="2027027" y="3394459"/>
-            <a:ext cx="3936893" cy="1508105"/>
+            <a:ext cx="3936893" cy="1862048"/>
           </a:xfrm>
           <a:prstGeom prst="rect">
             <a:avLst/>
@@ -13503,15 +13388,13 @@
             <a:r>
               <a:rPr lang="ja-JP" altLang="ja-JP" sz="2000" b="1" kern="100" dirty="0" smtClean="0">
                 <a:effectLst/>
-                <a:latin typeface="HGP教科書体" panose="02020600000000000000" pitchFamily="18" charset="-128"/>
-                <a:ea typeface="HGP教科書体" panose="02020600000000000000" pitchFamily="18" charset="-128"/>
+                <a:latin typeface="+mn-ea"/>
               </a:rPr>
               <a:t>自分登録したイベント一覧の閲覧</a:t>
             </a:r>
             <a:endParaRPr lang="en-US" altLang="ja-JP" sz="2000" b="1" kern="100" dirty="0" smtClean="0">
               <a:effectLst/>
-              <a:latin typeface="HGP教科書体" panose="02020600000000000000" pitchFamily="18" charset="-128"/>
-              <a:ea typeface="HGP教科書体" panose="02020600000000000000" pitchFamily="18" charset="-128"/>
+              <a:latin typeface="+mn-ea"/>
             </a:endParaRPr>
           </a:p>
           <a:p>
@@ -13526,16 +13409,14 @@
             <a:r>
               <a:rPr lang="ja-JP" altLang="en-US" sz="2000" kern="100" dirty="0" smtClean="0">
                 <a:effectLst/>
-                <a:latin typeface="HGP教科書体" panose="02020600000000000000" pitchFamily="18" charset="-128"/>
-                <a:ea typeface="HGP教科書体" panose="02020600000000000000" pitchFamily="18" charset="-128"/>
+                <a:latin typeface="+mn-ea"/>
                 <a:cs typeface="Times New Roman" panose="02020603050405020304" pitchFamily="18" charset="0"/>
               </a:rPr>
               <a:t>該当ユーザ登録したイベントをリストで表示する。</a:t>
             </a:r>
             <a:endParaRPr lang="en-US" altLang="ja-JP" sz="2000" kern="100" dirty="0" smtClean="0">
               <a:effectLst/>
-              <a:latin typeface="HGP教科書体" panose="02020600000000000000" pitchFamily="18" charset="-128"/>
-              <a:ea typeface="HGP教科書体" panose="02020600000000000000" pitchFamily="18" charset="-128"/>
+              <a:latin typeface="+mn-ea"/>
               <a:cs typeface="Times New Roman" panose="02020603050405020304" pitchFamily="18" charset="0"/>
             </a:endParaRPr>
           </a:p>
@@ -13550,8 +13431,7 @@
             </a:pPr>
             <a:endParaRPr lang="ja-JP" altLang="ja-JP" sz="2000" kern="100" dirty="0" smtClean="0">
               <a:effectLst/>
-              <a:latin typeface="HGP教科書体" panose="02020600000000000000" pitchFamily="18" charset="-128"/>
-              <a:ea typeface="HGP教科書体" panose="02020600000000000000" pitchFamily="18" charset="-128"/>
+              <a:latin typeface="+mn-ea"/>
               <a:cs typeface="Times New Roman" panose="02020603050405020304" pitchFamily="18" charset="0"/>
             </a:endParaRPr>
           </a:p>
@@ -14199,7 +14079,7 @@
         <p:spPr>
           <a:xfrm>
             <a:off x="6238148" y="3394459"/>
-            <a:ext cx="3921852" cy="1154162"/>
+            <a:ext cx="3921852" cy="1508105"/>
           </a:xfrm>
           <a:prstGeom prst="rect">
             <a:avLst/>
@@ -14225,15 +14105,13 @@
             <a:r>
               <a:rPr lang="ja-JP" altLang="ja-JP" sz="2000" b="1" kern="100" dirty="0" smtClean="0">
                 <a:effectLst/>
-                <a:latin typeface="HGP教科書体" panose="02020600000000000000" pitchFamily="18" charset="-128"/>
-                <a:ea typeface="HGP教科書体" panose="02020600000000000000" pitchFamily="18" charset="-128"/>
+                <a:latin typeface="+mn-ea"/>
               </a:rPr>
               <a:t>自分参加したイベント一覧の閲覧</a:t>
             </a:r>
             <a:endParaRPr lang="en-US" altLang="ja-JP" sz="2000" b="1" kern="100" dirty="0" smtClean="0">
               <a:effectLst/>
-              <a:latin typeface="HGP教科書体" panose="02020600000000000000" pitchFamily="18" charset="-128"/>
-              <a:ea typeface="HGP教科書体" panose="02020600000000000000" pitchFamily="18" charset="-128"/>
+              <a:latin typeface="+mn-ea"/>
             </a:endParaRPr>
           </a:p>
           <a:p>
@@ -14245,16 +14123,14 @@
             <a:r>
               <a:rPr lang="ja-JP" altLang="en-US" sz="2000" kern="100" dirty="0" smtClean="0">
                 <a:effectLst/>
-                <a:latin typeface="HGP教科書体" panose="02020600000000000000" pitchFamily="18" charset="-128"/>
-                <a:ea typeface="HGP教科書体" panose="02020600000000000000" pitchFamily="18" charset="-128"/>
+                <a:latin typeface="+mn-ea"/>
                 <a:cs typeface="Times New Roman" panose="02020603050405020304" pitchFamily="18" charset="0"/>
               </a:rPr>
               <a:t>該当ユーザ参加したイベントをリストで表示する。</a:t>
             </a:r>
             <a:endParaRPr lang="en-US" altLang="ja-JP" sz="2000" kern="100" dirty="0" smtClean="0">
               <a:effectLst/>
-              <a:latin typeface="HGP教科書体" panose="02020600000000000000" pitchFamily="18" charset="-128"/>
-              <a:ea typeface="HGP教科書体" panose="02020600000000000000" pitchFamily="18" charset="-128"/>
+              <a:latin typeface="+mn-ea"/>
               <a:cs typeface="Times New Roman" panose="02020603050405020304" pitchFamily="18" charset="0"/>
             </a:endParaRPr>
           </a:p>
@@ -14339,8 +14215,7 @@
             <a:r>
               <a:rPr lang="ja-JP" altLang="en-US" sz="2000" b="1" kern="100" dirty="0" smtClean="0">
                 <a:effectLst/>
-                <a:latin typeface="HGP教科書体" panose="02020600000000000000" pitchFamily="18" charset="-128"/>
-                <a:ea typeface="HGP教科書体" panose="02020600000000000000" pitchFamily="18" charset="-128"/>
+                <a:latin typeface="+mn-ea"/>
                 <a:cs typeface="Times New Roman" panose="02020603050405020304" pitchFamily="18" charset="0"/>
               </a:rPr>
               <a:t>該当ユーザ登録したイベントは全て</a:t>
@@ -14353,8 +14228,7 @@
                   </a:schemeClr>
                 </a:solidFill>
                 <a:effectLst/>
-                <a:latin typeface="HGP教科書体" panose="02020600000000000000" pitchFamily="18" charset="-128"/>
-                <a:ea typeface="HGP教科書体" panose="02020600000000000000" pitchFamily="18" charset="-128"/>
+                <a:latin typeface="+mn-ea"/>
                 <a:cs typeface="Times New Roman" panose="02020603050405020304" pitchFamily="18" charset="0"/>
               </a:rPr>
               <a:t>緑色</a:t>
@@ -14362,8 +14236,7 @@
             <a:r>
               <a:rPr lang="ja-JP" altLang="en-US" sz="2000" b="1" kern="100" dirty="0" smtClean="0">
                 <a:effectLst/>
-                <a:latin typeface="HGP教科書体" panose="02020600000000000000" pitchFamily="18" charset="-128"/>
-                <a:ea typeface="HGP教科書体" panose="02020600000000000000" pitchFamily="18" charset="-128"/>
+                <a:latin typeface="+mn-ea"/>
                 <a:cs typeface="Times New Roman" panose="02020603050405020304" pitchFamily="18" charset="0"/>
               </a:rPr>
               <a:t>で表示する。参加したイベントは</a:t>
@@ -14374,8 +14247,7 @@
                   <a:srgbClr val="C00000"/>
                 </a:solidFill>
                 <a:effectLst/>
-                <a:latin typeface="HGP教科書体" panose="02020600000000000000" pitchFamily="18" charset="-128"/>
-                <a:ea typeface="HGP教科書体" panose="02020600000000000000" pitchFamily="18" charset="-128"/>
+                <a:latin typeface="+mn-ea"/>
                 <a:cs typeface="Times New Roman" panose="02020603050405020304" pitchFamily="18" charset="0"/>
               </a:rPr>
               <a:t>赤色</a:t>
@@ -14383,16 +14255,14 @@
             <a:r>
               <a:rPr lang="ja-JP" altLang="en-US" sz="2000" b="1" kern="100" dirty="0" smtClean="0">
                 <a:effectLst/>
-                <a:latin typeface="HGP教科書体" panose="02020600000000000000" pitchFamily="18" charset="-128"/>
-                <a:ea typeface="HGP教科書体" panose="02020600000000000000" pitchFamily="18" charset="-128"/>
+                <a:latin typeface="+mn-ea"/>
                 <a:cs typeface="Times New Roman" panose="02020603050405020304" pitchFamily="18" charset="0"/>
               </a:rPr>
               <a:t>で表示する。</a:t>
             </a:r>
             <a:endParaRPr lang="ja-JP" altLang="ja-JP" sz="2000" b="1" kern="100" dirty="0" smtClean="0">
               <a:effectLst/>
-              <a:latin typeface="HGP教科書体" panose="02020600000000000000" pitchFamily="18" charset="-128"/>
-              <a:ea typeface="HGP教科書体" panose="02020600000000000000" pitchFamily="18" charset="-128"/>
+              <a:latin typeface="+mn-ea"/>
               <a:cs typeface="Times New Roman" panose="02020603050405020304" pitchFamily="18" charset="0"/>
             </a:endParaRPr>
           </a:p>
@@ -14479,8 +14349,8 @@
         </p:nvSpPr>
         <p:spPr>
           <a:xfrm>
-            <a:off x="1885951" y="474832"/>
-            <a:ext cx="3651250" cy="2215991"/>
+            <a:off x="1885950" y="269308"/>
+            <a:ext cx="8721090" cy="2215991"/>
           </a:xfrm>
           <a:prstGeom prst="rect">
             <a:avLst/>
@@ -14502,23 +14372,20 @@
             </a:pPr>
             <a:r>
               <a:rPr lang="ja-JP" altLang="en-US" sz="2000" b="1" kern="100" dirty="0" smtClean="0">
-                <a:latin typeface="HGP教科書体" panose="02020600000000000000" pitchFamily="18" charset="-128"/>
-                <a:ea typeface="HGP教科書体" panose="02020600000000000000" pitchFamily="18" charset="-128"/>
+                <a:latin typeface="+mn-ea"/>
               </a:rPr>
               <a:t>「開催予定のイベント」と「終了したイベント」</a:t>
             </a:r>
             <a:r>
               <a:rPr lang="ja-JP" altLang="ja-JP" sz="2000" b="1" kern="100" dirty="0" smtClean="0">
                 <a:effectLst/>
-                <a:latin typeface="HGP教科書体" panose="02020600000000000000" pitchFamily="18" charset="-128"/>
-                <a:ea typeface="HGP教科書体" panose="02020600000000000000" pitchFamily="18" charset="-128"/>
+                <a:latin typeface="+mn-ea"/>
               </a:rPr>
               <a:t>の閲覧</a:t>
             </a:r>
             <a:endParaRPr lang="en-US" altLang="ja-JP" sz="2000" b="1" kern="100" dirty="0" smtClean="0">
               <a:effectLst/>
-              <a:latin typeface="HGP教科書体" panose="02020600000000000000" pitchFamily="18" charset="-128"/>
-              <a:ea typeface="HGP教科書体" panose="02020600000000000000" pitchFamily="18" charset="-128"/>
+              <a:latin typeface="+mn-ea"/>
             </a:endParaRPr>
           </a:p>
           <a:p>
@@ -14529,14 +14396,12 @@
             </a:pPr>
             <a:r>
               <a:rPr lang="ja-JP" altLang="en-US" sz="2000" kern="100" dirty="0" smtClean="0">
-                <a:latin typeface="HGP教科書体" panose="02020600000000000000" pitchFamily="18" charset="-128"/>
-                <a:ea typeface="HGP教科書体" panose="02020600000000000000" pitchFamily="18" charset="-128"/>
+                <a:latin typeface="+mn-ea"/>
               </a:rPr>
               <a:t>イベント一覧で「開催予定のイベント」と「終了したイベント」を分けて閲覧出来る。</a:t>
             </a:r>
             <a:endParaRPr lang="en-US" altLang="ja-JP" sz="2000" kern="100" dirty="0" smtClean="0">
-              <a:latin typeface="HGP教科書体" panose="02020600000000000000" pitchFamily="18" charset="-128"/>
-              <a:ea typeface="HGP教科書体" panose="02020600000000000000" pitchFamily="18" charset="-128"/>
+              <a:latin typeface="+mn-ea"/>
             </a:endParaRPr>
           </a:p>
           <a:p>
@@ -14546,8 +14411,84 @@
               </a:lnSpc>
             </a:pPr>
             <a:endParaRPr lang="en-US" altLang="ja-JP" sz="2000" kern="100" dirty="0" smtClean="0">
-              <a:latin typeface="HGP教科書体" panose="02020600000000000000" pitchFamily="18" charset="-128"/>
-              <a:ea typeface="HGP教科書体" panose="02020600000000000000" pitchFamily="18" charset="-128"/>
+              <a:latin typeface="+mn-ea"/>
+            </a:endParaRPr>
+          </a:p>
+          <a:p>
+            <a:pPr marL="285750" indent="-285750" algn="just">
+              <a:lnSpc>
+                <a:spcPct val="115000"/>
+              </a:lnSpc>
+              <a:buFont typeface="Arial" panose="020B0604020202020204" pitchFamily="34" charset="0"/>
+              <a:buChar char="•"/>
+            </a:pPr>
+            <a:r>
+              <a:rPr lang="ja-JP" altLang="en-US" sz="2000" b="1" kern="100" dirty="0">
+                <a:latin typeface="+mn-ea"/>
+              </a:rPr>
+              <a:t>イベント一覧とユーザ一覧で</a:t>
+            </a:r>
+            <a:r>
+              <a:rPr lang="ja-JP" altLang="ja-JP" sz="2000" b="1" kern="100" dirty="0">
+                <a:latin typeface="+mn-ea"/>
+              </a:rPr>
+              <a:t>検索ワード</a:t>
+            </a:r>
+            <a:r>
+              <a:rPr lang="ja-JP" altLang="en-US" sz="2000" b="1" kern="100" dirty="0">
+                <a:latin typeface="+mn-ea"/>
+              </a:rPr>
+              <a:t>機能</a:t>
+            </a:r>
+            <a:endParaRPr lang="en-US" altLang="ja-JP" sz="2000" b="1" kern="100" dirty="0">
+              <a:latin typeface="+mn-ea"/>
+            </a:endParaRPr>
+          </a:p>
+          <a:p>
+            <a:pPr algn="just">
+              <a:lnSpc>
+                <a:spcPct val="115000"/>
+              </a:lnSpc>
+            </a:pPr>
+            <a:r>
+              <a:rPr lang="ja-JP" altLang="en-US" sz="2000" kern="100" dirty="0">
+                <a:latin typeface="+mn-ea"/>
+              </a:rPr>
+              <a:t>イベント一覧とユーザ一覧のリストで</a:t>
+            </a:r>
+            <a:r>
+              <a:rPr lang="ja-JP" altLang="ja-JP" sz="2000" kern="100" dirty="0">
+                <a:latin typeface="+mn-ea"/>
+              </a:rPr>
+              <a:t>検索ワード</a:t>
+            </a:r>
+            <a:r>
+              <a:rPr lang="ja-JP" altLang="en-US" sz="2000" kern="100" dirty="0">
+                <a:latin typeface="+mn-ea"/>
+              </a:rPr>
+              <a:t>に関するイベント情報を取り出せる。</a:t>
+            </a:r>
+            <a:r>
+              <a:rPr lang="ja-JP" altLang="ja-JP" sz="2000" kern="100" dirty="0">
+                <a:latin typeface="+mn-ea"/>
+              </a:rPr>
+              <a:t>ワード</a:t>
+            </a:r>
+            <a:r>
+              <a:rPr lang="ja-JP" altLang="en-US" sz="2000" kern="100" dirty="0">
+                <a:latin typeface="+mn-ea"/>
+              </a:rPr>
+              <a:t>の検索範囲は全てイベントの項目</a:t>
+            </a:r>
+            <a:r>
+              <a:rPr lang="ja-JP" altLang="en-US" sz="2000" kern="100" dirty="0" smtClean="0">
+                <a:latin typeface="+mn-ea"/>
+              </a:rPr>
+              <a:t>。</a:t>
+            </a:r>
+            <a:endParaRPr lang="ja-JP" altLang="ja-JP" sz="2000" kern="100" dirty="0">
+              <a:latin typeface="+mn-ea"/>
+              <a:cs typeface="Times New Roman" panose="02020603050405020304" pitchFamily="18" charset="0"/>
             </a:endParaRPr>
           </a:p>
         </p:txBody>
@@ -15181,119 +15122,6 @@
               <a:effectLst>
                 <a:reflection blurRad="6350" stA="53000" endA="300" endPos="35500" dir="5400000" sy="-90000" algn="bl" rotWithShape="0"/>
               </a:effectLst>
-            </a:endParaRPr>
-          </a:p>
-        </p:txBody>
-      </p:sp>
-      <p:sp>
-        <p:nvSpPr>
-          <p:cNvPr id="26" name="テキスト ボックス 25"/>
-          <p:cNvSpPr txBox="1"/>
-          <p:nvPr/>
-        </p:nvSpPr>
-        <p:spPr>
-          <a:xfrm>
-            <a:off x="5776589" y="483528"/>
-            <a:ext cx="4560570" cy="1862048"/>
-          </a:xfrm>
-          <a:prstGeom prst="rect">
-            <a:avLst/>
-          </a:prstGeom>
-          <a:noFill/>
-        </p:spPr>
-        <p:txBody>
-          <a:bodyPr wrap="square" rtlCol="0">
-            <a:spAutoFit/>
-          </a:bodyPr>
-          <a:lstStyle/>
-          <a:p>
-            <a:pPr marL="285750" indent="-285750" algn="just">
-              <a:lnSpc>
-                <a:spcPct val="115000"/>
-              </a:lnSpc>
-              <a:buFont typeface="Arial" panose="020B0604020202020204" pitchFamily="34" charset="0"/>
-              <a:buChar char="•"/>
-            </a:pPr>
-            <a:r>
-              <a:rPr lang="ja-JP" altLang="en-US" sz="2000" b="1" kern="100" dirty="0" smtClean="0">
-                <a:effectLst/>
-                <a:latin typeface="HGP教科書体" panose="02020600000000000000" pitchFamily="18" charset="-128"/>
-                <a:ea typeface="HGP教科書体" panose="02020600000000000000" pitchFamily="18" charset="-128"/>
-              </a:rPr>
-              <a:t>イベント一覧とユーザ一覧で</a:t>
-            </a:r>
-            <a:r>
-              <a:rPr lang="ja-JP" altLang="ja-JP" sz="2000" b="1" kern="100" dirty="0" smtClean="0">
-                <a:effectLst/>
-                <a:latin typeface="HGP教科書体" panose="02020600000000000000" pitchFamily="18" charset="-128"/>
-                <a:ea typeface="HGP教科書体" panose="02020600000000000000" pitchFamily="18" charset="-128"/>
-              </a:rPr>
-              <a:t>検索ワード</a:t>
-            </a:r>
-            <a:r>
-              <a:rPr lang="ja-JP" altLang="en-US" sz="2000" b="1" kern="100" dirty="0" smtClean="0">
-                <a:effectLst/>
-                <a:latin typeface="HGP教科書体" panose="02020600000000000000" pitchFamily="18" charset="-128"/>
-                <a:ea typeface="HGP教科書体" panose="02020600000000000000" pitchFamily="18" charset="-128"/>
-              </a:rPr>
-              <a:t>機能</a:t>
-            </a:r>
-            <a:endParaRPr lang="en-US" altLang="ja-JP" sz="2000" b="1" kern="100" dirty="0" smtClean="0">
-              <a:latin typeface="HGP教科書体" panose="02020600000000000000" pitchFamily="18" charset="-128"/>
-              <a:ea typeface="HGP教科書体" panose="02020600000000000000" pitchFamily="18" charset="-128"/>
-            </a:endParaRPr>
-          </a:p>
-          <a:p>
-            <a:pPr algn="just">
-              <a:lnSpc>
-                <a:spcPct val="115000"/>
-              </a:lnSpc>
-            </a:pPr>
-            <a:r>
-              <a:rPr lang="ja-JP" altLang="en-US" sz="2000" kern="100" dirty="0" smtClean="0">
-                <a:effectLst/>
-                <a:latin typeface="HGP教科書体" panose="02020600000000000000" pitchFamily="18" charset="-128"/>
-                <a:ea typeface="HGP教科書体" panose="02020600000000000000" pitchFamily="18" charset="-128"/>
-              </a:rPr>
-              <a:t>イベント一覧とユーザ一覧のリストで</a:t>
-            </a:r>
-            <a:r>
-              <a:rPr lang="ja-JP" altLang="ja-JP" sz="2000" kern="100" dirty="0" smtClean="0">
-                <a:effectLst/>
-                <a:latin typeface="HGP教科書体" panose="02020600000000000000" pitchFamily="18" charset="-128"/>
-                <a:ea typeface="HGP教科書体" panose="02020600000000000000" pitchFamily="18" charset="-128"/>
-              </a:rPr>
-              <a:t>検索ワード</a:t>
-            </a:r>
-            <a:r>
-              <a:rPr lang="ja-JP" altLang="en-US" sz="2000" kern="100" dirty="0" smtClean="0">
-                <a:effectLst/>
-                <a:latin typeface="HGP教科書体" panose="02020600000000000000" pitchFamily="18" charset="-128"/>
-                <a:ea typeface="HGP教科書体" panose="02020600000000000000" pitchFamily="18" charset="-128"/>
-              </a:rPr>
-              <a:t>に関するイベント情報を取り出せる。</a:t>
-            </a:r>
-            <a:r>
-              <a:rPr lang="ja-JP" altLang="ja-JP" sz="2000" kern="100" dirty="0" smtClean="0">
-                <a:effectLst/>
-                <a:latin typeface="HGP教科書体" panose="02020600000000000000" pitchFamily="18" charset="-128"/>
-                <a:ea typeface="HGP教科書体" panose="02020600000000000000" pitchFamily="18" charset="-128"/>
-              </a:rPr>
-              <a:t>ワード</a:t>
-            </a:r>
-            <a:r>
-              <a:rPr lang="ja-JP" altLang="en-US" sz="2000" kern="100" dirty="0" smtClean="0">
-                <a:effectLst/>
-                <a:latin typeface="HGP教科書体" panose="02020600000000000000" pitchFamily="18" charset="-128"/>
-                <a:ea typeface="HGP教科書体" panose="02020600000000000000" pitchFamily="18" charset="-128"/>
-              </a:rPr>
-              <a:t>の検索範囲は全てイベントの項目。</a:t>
-            </a:r>
-            <a:endParaRPr lang="ja-JP" altLang="ja-JP" sz="2000" kern="100" dirty="0" smtClean="0">
-              <a:effectLst/>
-              <a:latin typeface="HGP教科書体" panose="02020600000000000000" pitchFamily="18" charset="-128"/>
-              <a:ea typeface="HGP教科書体" panose="02020600000000000000" pitchFamily="18" charset="-128"/>
-              <a:cs typeface="Times New Roman" panose="02020603050405020304" pitchFamily="18" charset="0"/>
             </a:endParaRPr>
           </a:p>
         </p:txBody>
@@ -15713,8 +15541,8 @@
         </p:nvSpPr>
         <p:spPr>
           <a:xfrm>
-            <a:off x="1885950" y="444744"/>
-            <a:ext cx="8038174" cy="1154162"/>
+            <a:off x="1885950" y="408168"/>
+            <a:ext cx="8038174" cy="1108958"/>
           </a:xfrm>
           <a:prstGeom prst="rect">
             <a:avLst/>
@@ -15740,22 +15568,19 @@
             <a:r>
               <a:rPr lang="ja-JP" altLang="ja-JP" sz="2000" b="1" kern="100" dirty="0" smtClean="0">
                 <a:effectLst/>
-                <a:latin typeface="HGP教科書体" panose="02020600000000000000" pitchFamily="18" charset="-128"/>
-                <a:ea typeface="HGP教科書体" panose="02020600000000000000" pitchFamily="18" charset="-128"/>
+                <a:latin typeface="+mn-ea"/>
               </a:rPr>
               <a:t>イベントの登録者にメールを送信する</a:t>
             </a:r>
             <a:r>
               <a:rPr lang="ja-JP" altLang="en-US" sz="2000" b="1" kern="100" dirty="0" smtClean="0">
                 <a:effectLst/>
-                <a:latin typeface="HGP教科書体" panose="02020600000000000000" pitchFamily="18" charset="-128"/>
-                <a:ea typeface="HGP教科書体" panose="02020600000000000000" pitchFamily="18" charset="-128"/>
+                <a:latin typeface="+mn-ea"/>
               </a:rPr>
               <a:t>機能</a:t>
             </a:r>
             <a:endParaRPr lang="en-US" altLang="ja-JP" sz="2000" b="1" kern="100" dirty="0" smtClean="0">
-              <a:latin typeface="HGP教科書体" panose="02020600000000000000" pitchFamily="18" charset="-128"/>
-              <a:ea typeface="HGP教科書体" panose="02020600000000000000" pitchFamily="18" charset="-128"/>
+              <a:latin typeface="+mn-ea"/>
             </a:endParaRPr>
           </a:p>
           <a:p>
@@ -15767,17 +15592,15 @@
             <a:r>
               <a:rPr lang="ja-JP" altLang="en-US" sz="2000" kern="100" dirty="0" smtClean="0">
                 <a:effectLst/>
-                <a:latin typeface="HGP教科書体" panose="02020600000000000000" pitchFamily="18" charset="-128"/>
-                <a:ea typeface="HGP教科書体" panose="02020600000000000000" pitchFamily="18" charset="-128"/>
+                <a:latin typeface="+mn-ea"/>
                 <a:cs typeface="Times New Roman" panose="02020603050405020304" pitchFamily="18" charset="0"/>
               </a:rPr>
-              <a:t>毎日午前中</a:t>
+              <a:t>毎日午前</a:t>
             </a:r>
             <a:r>
               <a:rPr lang="en-US" altLang="ja-JP" sz="2000" kern="100" dirty="0" smtClean="0">
                 <a:effectLst/>
-                <a:latin typeface="HGP教科書体" panose="02020600000000000000" pitchFamily="18" charset="-128"/>
-                <a:ea typeface="HGP教科書体" panose="02020600000000000000" pitchFamily="18" charset="-128"/>
+                <a:latin typeface="+mn-ea"/>
                 <a:cs typeface="Times New Roman" panose="02020603050405020304" pitchFamily="18" charset="0"/>
               </a:rPr>
               <a:t>9</a:t>
@@ -15785,8 +15608,7 @@
             <a:r>
               <a:rPr lang="ja-JP" altLang="en-US" sz="2000" kern="100" dirty="0" smtClean="0">
                 <a:effectLst/>
-                <a:latin typeface="HGP教科書体" panose="02020600000000000000" pitchFamily="18" charset="-128"/>
-                <a:ea typeface="HGP教科書体" panose="02020600000000000000" pitchFamily="18" charset="-128"/>
+                <a:latin typeface="+mn-ea"/>
                 <a:cs typeface="Times New Roman" panose="02020603050405020304" pitchFamily="18" charset="0"/>
               </a:rPr>
               <a:t>時と午後</a:t>
@@ -15794,8 +15616,7 @@
             <a:r>
               <a:rPr lang="en-US" altLang="ja-JP" sz="2000" kern="100" dirty="0" smtClean="0">
                 <a:effectLst/>
-                <a:latin typeface="HGP教科書体" panose="02020600000000000000" pitchFamily="18" charset="-128"/>
-                <a:ea typeface="HGP教科書体" panose="02020600000000000000" pitchFamily="18" charset="-128"/>
+                <a:latin typeface="+mn-ea"/>
                 <a:cs typeface="Times New Roman" panose="02020603050405020304" pitchFamily="18" charset="0"/>
               </a:rPr>
               <a:t>15</a:t>
@@ -15803,16 +15624,14 @@
             <a:r>
               <a:rPr lang="ja-JP" altLang="en-US" sz="2000" kern="100" dirty="0" smtClean="0">
                 <a:effectLst/>
-                <a:latin typeface="HGP教科書体" panose="02020600000000000000" pitchFamily="18" charset="-128"/>
-                <a:ea typeface="HGP教科書体" panose="02020600000000000000" pitchFamily="18" charset="-128"/>
+                <a:latin typeface="+mn-ea"/>
                 <a:cs typeface="Times New Roman" panose="02020603050405020304" pitchFamily="18" charset="0"/>
               </a:rPr>
               <a:t>時の時間を設定して、全てのイベントの「参加」のところが変更がある場合は該当イベントの管理ユーザにメールを送信する。</a:t>
             </a:r>
             <a:endParaRPr lang="en-US" altLang="ja-JP" sz="2000" kern="100" dirty="0" smtClean="0">
               <a:effectLst/>
-              <a:latin typeface="HGP教科書体" panose="02020600000000000000" pitchFamily="18" charset="-128"/>
-              <a:ea typeface="HGP教科書体" panose="02020600000000000000" pitchFamily="18" charset="-128"/>
+              <a:latin typeface="+mn-ea"/>
               <a:cs typeface="Times New Roman" panose="02020603050405020304" pitchFamily="18" charset="0"/>
             </a:endParaRPr>
           </a:p>

</xml_diff>